<commit_message>
more instruction for the pigeons project excerise in working directories and paths
</commit_message>
<xml_diff>
--- a/slides/03-normal-distributions-probabilities-ci.pptx
+++ b/slides/03-normal-distributions-probabilities-ci.pptx
@@ -5,10 +5,10 @@
     <p:sldMasterId id="2147483648" r:id="rId1"/>
   </p:sldMasterIdLst>
   <p:notesMasterIdLst>
-    <p:notesMasterId r:id="rId47"/>
+    <p:notesMasterId r:id="rId48"/>
   </p:notesMasterIdLst>
   <p:handoutMasterIdLst>
-    <p:handoutMasterId r:id="rId48"/>
+    <p:handoutMasterId r:id="rId49"/>
   </p:handoutMasterIdLst>
   <p:sldIdLst>
     <p:sldId id="256" r:id="rId2"/>
@@ -37,54 +37,55 @@
     <p:sldId id="399" r:id="rId25"/>
     <p:sldId id="400" r:id="rId26"/>
     <p:sldId id="401" r:id="rId27"/>
-    <p:sldId id="403" r:id="rId28"/>
-    <p:sldId id="404" r:id="rId29"/>
-    <p:sldId id="405" r:id="rId30"/>
-    <p:sldId id="406" r:id="rId31"/>
-    <p:sldId id="427" r:id="rId32"/>
-    <p:sldId id="425" r:id="rId33"/>
-    <p:sldId id="407" r:id="rId34"/>
-    <p:sldId id="408" r:id="rId35"/>
-    <p:sldId id="359" r:id="rId36"/>
-    <p:sldId id="356" r:id="rId37"/>
-    <p:sldId id="357" r:id="rId38"/>
-    <p:sldId id="358" r:id="rId39"/>
-    <p:sldId id="360" r:id="rId40"/>
-    <p:sldId id="361" r:id="rId41"/>
-    <p:sldId id="363" r:id="rId42"/>
-    <p:sldId id="366" r:id="rId43"/>
-    <p:sldId id="364" r:id="rId44"/>
-    <p:sldId id="365" r:id="rId45"/>
-    <p:sldId id="411" r:id="rId46"/>
+    <p:sldId id="428" r:id="rId28"/>
+    <p:sldId id="403" r:id="rId29"/>
+    <p:sldId id="404" r:id="rId30"/>
+    <p:sldId id="405" r:id="rId31"/>
+    <p:sldId id="406" r:id="rId32"/>
+    <p:sldId id="427" r:id="rId33"/>
+    <p:sldId id="425" r:id="rId34"/>
+    <p:sldId id="407" r:id="rId35"/>
+    <p:sldId id="408" r:id="rId36"/>
+    <p:sldId id="359" r:id="rId37"/>
+    <p:sldId id="356" r:id="rId38"/>
+    <p:sldId id="357" r:id="rId39"/>
+    <p:sldId id="358" r:id="rId40"/>
+    <p:sldId id="360" r:id="rId41"/>
+    <p:sldId id="361" r:id="rId42"/>
+    <p:sldId id="363" r:id="rId43"/>
+    <p:sldId id="366" r:id="rId44"/>
+    <p:sldId id="364" r:id="rId45"/>
+    <p:sldId id="365" r:id="rId46"/>
+    <p:sldId id="411" r:id="rId47"/>
   </p:sldIdLst>
   <p:sldSz cx="9144000" cy="6858000" type="screen4x3"/>
   <p:notesSz cx="10234613" cy="7104063"/>
   <p:embeddedFontLst>
     <p:embeddedFont>
       <p:font typeface="Cambria Math" panose="02040503050406030204" pitchFamily="18" charset="0"/>
-      <p:regular r:id="rId49"/>
+      <p:regular r:id="rId50"/>
     </p:embeddedFont>
     <p:embeddedFont>
       <p:font typeface="Lucida Console" panose="020B0609040504020204" pitchFamily="49" charset="0"/>
-      <p:regular r:id="rId50"/>
+      <p:regular r:id="rId51"/>
     </p:embeddedFont>
     <p:embeddedFont>
       <p:font typeface="Consolas" panose="020B0609020204030204" pitchFamily="49" charset="0"/>
-      <p:regular r:id="rId51"/>
-      <p:bold r:id="rId52"/>
-      <p:italic r:id="rId53"/>
-      <p:boldItalic r:id="rId54"/>
+      <p:regular r:id="rId52"/>
+      <p:bold r:id="rId53"/>
+      <p:italic r:id="rId54"/>
+      <p:boldItalic r:id="rId55"/>
     </p:embeddedFont>
     <p:embeddedFont>
       <p:font typeface="Calibri" panose="020F0502020204030204" pitchFamily="34" charset="0"/>
-      <p:regular r:id="rId55"/>
-      <p:bold r:id="rId56"/>
-      <p:italic r:id="rId57"/>
-      <p:boldItalic r:id="rId58"/>
+      <p:regular r:id="rId56"/>
+      <p:bold r:id="rId57"/>
+      <p:italic r:id="rId58"/>
+      <p:boldItalic r:id="rId59"/>
     </p:embeddedFont>
   </p:embeddedFontLst>
   <p:custDataLst>
-    <p:tags r:id="rId59"/>
+    <p:tags r:id="rId60"/>
   </p:custDataLst>
   <p:defaultTextStyle>
     <a:defPPr>
@@ -1341,7 +1342,7 @@
                   <a:spcPct val="0"/>
                 </a:spcBef>
               </a:pPr>
-              <a:t>30</a:t>
+              <a:t>31</a:t>
             </a:fld>
             <a:endParaRPr kumimoji="0" lang="en-GB" altLang="en-US" smtClean="0">
               <a:latin typeface="Times New Roman" pitchFamily="18" charset="0"/>
@@ -1597,7 +1598,7 @@
                   <a:spcPct val="0"/>
                 </a:spcBef>
               </a:pPr>
-              <a:t>31</a:t>
+              <a:t>32</a:t>
             </a:fld>
             <a:endParaRPr kumimoji="0" lang="en-GB" altLang="en-US" smtClean="0">
               <a:latin typeface="Times New Roman" pitchFamily="18" charset="0"/>
@@ -1853,7 +1854,7 @@
                   <a:spcPct val="0"/>
                 </a:spcBef>
               </a:pPr>
-              <a:t>32</a:t>
+              <a:t>33</a:t>
             </a:fld>
             <a:endParaRPr kumimoji="0" lang="en-GB" altLang="en-US" smtClean="0">
               <a:latin typeface="Times New Roman" pitchFamily="18" charset="0"/>
@@ -1939,7 +1940,7 @@
           <a:p>
             <a:fld id="{EE96B617-D044-4BB8-AD54-2A899191954D}" type="slidenum">
               <a:rPr lang="en-GB" smtClean="0"/>
-              <a:t>33</a:t>
+              <a:t>34</a:t>
             </a:fld>
             <a:endParaRPr lang="en-GB"/>
           </a:p>
@@ -2023,7 +2024,7 @@
           <a:p>
             <a:fld id="{EE96B617-D044-4BB8-AD54-2A899191954D}" type="slidenum">
               <a:rPr lang="en-GB" smtClean="0"/>
-              <a:t>36</a:t>
+              <a:t>37</a:t>
             </a:fld>
             <a:endParaRPr lang="en-GB"/>
           </a:p>
@@ -2107,7 +2108,7 @@
           <a:p>
             <a:fld id="{EE96B617-D044-4BB8-AD54-2A899191954D}" type="slidenum">
               <a:rPr lang="en-GB" smtClean="0"/>
-              <a:t>37</a:t>
+              <a:t>38</a:t>
             </a:fld>
             <a:endParaRPr lang="en-GB"/>
           </a:p>
@@ -2191,7 +2192,7 @@
           <a:p>
             <a:fld id="{EE96B617-D044-4BB8-AD54-2A899191954D}" type="slidenum">
               <a:rPr lang="en-GB" smtClean="0"/>
-              <a:t>38</a:t>
+              <a:t>39</a:t>
             </a:fld>
             <a:endParaRPr lang="en-GB"/>
           </a:p>
@@ -2281,7 +2282,7 @@
               <a:pPr>
                 <a:defRPr/>
               </a:pPr>
-              <a:t>43</a:t>
+              <a:t>44</a:t>
             </a:fld>
             <a:endParaRPr lang="en-GB"/>
           </a:p>
@@ -2365,7 +2366,7 @@
           <a:p>
             <a:fld id="{EE96B617-D044-4BB8-AD54-2A899191954D}" type="slidenum">
               <a:rPr lang="en-GB" smtClean="0"/>
-              <a:t>45</a:t>
+              <a:t>46</a:t>
             </a:fld>
             <a:endParaRPr lang="en-GB"/>
           </a:p>
@@ -3481,7 +3482,7 @@
                   <a:spcPct val="0"/>
                 </a:spcBef>
               </a:pPr>
-              <a:t>28</a:t>
+              <a:t>29</a:t>
             </a:fld>
             <a:endParaRPr kumimoji="0" lang="en-GB" altLang="en-US" smtClean="0">
               <a:latin typeface="Times New Roman" pitchFamily="18" charset="0"/>
@@ -3567,7 +3568,7 @@
           <a:p>
             <a:fld id="{EE96B617-D044-4BB8-AD54-2A899191954D}" type="slidenum">
               <a:rPr lang="en-GB" smtClean="0"/>
-              <a:t>29</a:t>
+              <a:t>30</a:t>
             </a:fld>
             <a:endParaRPr lang="en-GB"/>
           </a:p>
@@ -11088,7 +11089,7 @@
           <a:graphicData uri="http://schemas.openxmlformats.org/presentationml/2006/ole">
             <mc:AlternateContent xmlns:mc="http://schemas.openxmlformats.org/markup-compatibility/2006">
               <mc:Choice xmlns:v="urn:schemas-microsoft-com:vml" Requires="v">
-                <p:oleObj spid="_x0000_s21569" name="Equation" r:id="rId4" imgW="609480" imgH="520560" progId="Equation.3">
+                <p:oleObj spid="_x0000_s21572" name="Equation" r:id="rId4" imgW="609480" imgH="520560" progId="Equation.3">
                   <p:embed/>
                 </p:oleObj>
               </mc:Choice>
@@ -12360,7 +12361,7 @@
           <a:graphicData uri="http://schemas.openxmlformats.org/presentationml/2006/ole">
             <mc:AlternateContent xmlns:mc="http://schemas.openxmlformats.org/markup-compatibility/2006">
               <mc:Choice xmlns:v="urn:schemas-microsoft-com:vml" Requires="v">
-                <p:oleObj spid="_x0000_s22592" name="Equation" r:id="rId3" imgW="1015920" imgH="520560" progId="Equation.3">
+                <p:oleObj spid="_x0000_s22595" name="Equation" r:id="rId3" imgW="1015920" imgH="520560" progId="Equation.3">
                   <p:embed/>
                 </p:oleObj>
               </mc:Choice>
@@ -16860,8 +16861,8 @@
         </p:nvSpPr>
         <p:spPr>
           <a:xfrm>
-            <a:off x="4751388" y="1916113"/>
-            <a:ext cx="4392612" cy="4191000"/>
+            <a:off x="4751388" y="1916112"/>
+            <a:ext cx="4392612" cy="4332287"/>
           </a:xfrm>
         </p:spPr>
         <p:txBody>
@@ -16906,6 +16907,20 @@
               <a:rPr lang="en-GB" altLang="en-US" sz="2400" dirty="0" smtClean="0"/>
               <a:t>estimate</a:t>
             </a:r>
+          </a:p>
+          <a:p>
+            <a:pPr eaLnBrk="1" hangingPunct="1"/>
+            <a:endParaRPr lang="en-GB" altLang="en-US" sz="2400" dirty="0"/>
+          </a:p>
+          <a:p>
+            <a:pPr marL="0" indent="0" eaLnBrk="1" hangingPunct="1">
+              <a:buNone/>
+            </a:pPr>
+            <a:r>
+              <a:rPr lang="en-GB" altLang="en-US" sz="2400" smtClean="0"/>
+              <a:t>…….</a:t>
+            </a:r>
+            <a:endParaRPr lang="en-GB" altLang="en-US" sz="2400" dirty="0" smtClean="0"/>
           </a:p>
           <a:p>
             <a:pPr marL="0" indent="0" eaLnBrk="1" hangingPunct="1">
@@ -17542,6 +17557,109 @@
       </p:grpSpPr>
       <p:sp>
         <p:nvSpPr>
+          <p:cNvPr id="2" name="Title 1"/>
+          <p:cNvSpPr>
+            <a:spLocks noGrp="1"/>
+          </p:cNvSpPr>
+          <p:nvPr>
+            <p:ph type="ctrTitle"/>
+          </p:nvPr>
+        </p:nvSpPr>
+        <p:spPr/>
+        <p:txBody>
+          <a:bodyPr/>
+          <a:lstStyle/>
+          <a:p>
+            <a:r>
+              <a:rPr lang="en-GB" dirty="0" smtClean="0"/>
+              <a:t>Confidence intervals</a:t>
+            </a:r>
+            <a:endParaRPr lang="en-GB" dirty="0"/>
+          </a:p>
+        </p:txBody>
+      </p:sp>
+      <p:sp>
+        <p:nvSpPr>
+          <p:cNvPr id="3" name="Subtitle 2"/>
+          <p:cNvSpPr>
+            <a:spLocks noGrp="1"/>
+          </p:cNvSpPr>
+          <p:nvPr>
+            <p:ph type="subTitle" idx="1"/>
+          </p:nvPr>
+        </p:nvSpPr>
+        <p:spPr/>
+        <p:txBody>
+          <a:bodyPr/>
+          <a:lstStyle/>
+          <a:p>
+            <a:endParaRPr lang="en-GB"/>
+          </a:p>
+        </p:txBody>
+      </p:sp>
+      <p:sp>
+        <p:nvSpPr>
+          <p:cNvPr id="4" name="Slide Number Placeholder 3"/>
+          <p:cNvSpPr>
+            <a:spLocks noGrp="1"/>
+          </p:cNvSpPr>
+          <p:nvPr>
+            <p:ph type="sldNum" sz="quarter" idx="12"/>
+          </p:nvPr>
+        </p:nvSpPr>
+        <p:spPr/>
+        <p:txBody>
+          <a:bodyPr/>
+          <a:lstStyle/>
+          <a:p>
+            <a:fld id="{B6F15528-21DE-4FAA-801E-634DDDAF4B2B}" type="slidenum">
+              <a:rPr lang="en-US" smtClean="0"/>
+              <a:pPr/>
+              <a:t>27</a:t>
+            </a:fld>
+            <a:endParaRPr lang="en-US"/>
+          </a:p>
+        </p:txBody>
+      </p:sp>
+    </p:spTree>
+    <p:extLst>
+      <p:ext uri="{BB962C8B-B14F-4D97-AF65-F5344CB8AC3E}">
+        <p14:creationId xmlns:p14="http://schemas.microsoft.com/office/powerpoint/2010/main" val="2461353174"/>
+      </p:ext>
+    </p:extLst>
+  </p:cSld>
+  <p:clrMapOvr>
+    <a:masterClrMapping/>
+  </p:clrMapOvr>
+  <p:timing>
+    <p:tnLst>
+      <p:par>
+        <p:cTn id="1" dur="indefinite" restart="never" nodeType="tmRoot"/>
+      </p:par>
+    </p:tnLst>
+  </p:timing>
+</p:sld>
+</file>
+
+<file path=ppt/slides/slide28.xml><?xml version="1.0" encoding="utf-8"?>
+<p:sld xmlns:a="http://schemas.openxmlformats.org/drawingml/2006/main" xmlns:r="http://schemas.openxmlformats.org/officeDocument/2006/relationships" xmlns:p="http://schemas.openxmlformats.org/presentationml/2006/main">
+  <p:cSld>
+    <p:spTree>
+      <p:nvGrpSpPr>
+        <p:cNvPr id="1" name=""/>
+        <p:cNvGrpSpPr/>
+        <p:nvPr/>
+      </p:nvGrpSpPr>
+      <p:grpSpPr>
+        <a:xfrm>
+          <a:off x="0" y="0"/>
+          <a:ext cx="0" cy="0"/>
+          <a:chOff x="0" y="0"/>
+          <a:chExt cx="0" cy="0"/>
+        </a:xfrm>
+      </p:grpSpPr>
+      <p:sp>
+        <p:nvSpPr>
           <p:cNvPr id="26627" name="Content Placeholder 2"/>
           <p:cNvSpPr>
             <a:spLocks noGrp="1"/>
@@ -17633,7 +17751,7 @@
               <a:pPr>
                 <a:defRPr/>
               </a:pPr>
-              <a:t>27</a:t>
+              <a:t>28</a:t>
             </a:fld>
             <a:endParaRPr lang="en-GB"/>
           </a:p>
@@ -17717,7 +17835,7 @@
 </p:sld>
 </file>
 
-<file path=ppt/slides/slide28.xml><?xml version="1.0" encoding="utf-8"?>
+<file path=ppt/slides/slide29.xml><?xml version="1.0" encoding="utf-8"?>
 <p:sld xmlns:a="http://schemas.openxmlformats.org/drawingml/2006/main" xmlns:r="http://schemas.openxmlformats.org/officeDocument/2006/relationships" xmlns:p="http://schemas.openxmlformats.org/presentationml/2006/main">
   <p:cSld>
     <p:spTree>
@@ -18471,7 +18589,7 @@
               <a:pPr>
                 <a:defRPr/>
               </a:pPr>
-              <a:t>28</a:t>
+              <a:t>29</a:t>
             </a:fld>
             <a:endParaRPr lang="en-GB"/>
           </a:p>
@@ -19340,7 +19458,184 @@
 </p:sld>
 </file>
 
-<file path=ppt/slides/slide29.xml><?xml version="1.0" encoding="utf-8"?>
+<file path=ppt/slides/slide3.xml><?xml version="1.0" encoding="utf-8"?>
+<p:sld xmlns:a="http://schemas.openxmlformats.org/drawingml/2006/main" xmlns:r="http://schemas.openxmlformats.org/officeDocument/2006/relationships" xmlns:p="http://schemas.openxmlformats.org/presentationml/2006/main">
+  <p:cSld>
+    <p:spTree>
+      <p:nvGrpSpPr>
+        <p:cNvPr id="1" name=""/>
+        <p:cNvGrpSpPr/>
+        <p:nvPr/>
+      </p:nvGrpSpPr>
+      <p:grpSpPr>
+        <a:xfrm>
+          <a:off x="0" y="0"/>
+          <a:ext cx="0" cy="0"/>
+          <a:chOff x="0" y="0"/>
+          <a:chExt cx="0" cy="0"/>
+        </a:xfrm>
+      </p:grpSpPr>
+      <p:sp>
+        <p:nvSpPr>
+          <p:cNvPr id="2" name="Title 1"/>
+          <p:cNvSpPr>
+            <a:spLocks noGrp="1"/>
+          </p:cNvSpPr>
+          <p:nvPr>
+            <p:ph type="title"/>
+          </p:nvPr>
+        </p:nvSpPr>
+        <p:spPr/>
+        <p:txBody>
+          <a:bodyPr/>
+          <a:lstStyle/>
+          <a:p>
+            <a:r>
+              <a:rPr lang="en-GB" dirty="0" smtClean="0"/>
+              <a:t>Summary of this week</a:t>
+            </a:r>
+            <a:endParaRPr lang="en-GB" dirty="0"/>
+          </a:p>
+        </p:txBody>
+      </p:sp>
+      <p:sp>
+        <p:nvSpPr>
+          <p:cNvPr id="3" name="Content Placeholder 2"/>
+          <p:cNvSpPr>
+            <a:spLocks noGrp="1"/>
+          </p:cNvSpPr>
+          <p:nvPr>
+            <p:ph idx="1"/>
+          </p:nvPr>
+        </p:nvSpPr>
+        <p:spPr/>
+        <p:txBody>
+          <a:bodyPr>
+            <a:normAutofit fontScale="92500" lnSpcReduction="20000"/>
+          </a:bodyPr>
+          <a:lstStyle/>
+          <a:p>
+            <a:r>
+              <a:rPr lang="en-GB" dirty="0" smtClean="0"/>
+              <a:t>Continuous variables: The </a:t>
+            </a:r>
+            <a:r>
+              <a:rPr lang="en-GB" dirty="0" smtClean="0"/>
+              <a:t>normal </a:t>
+            </a:r>
+            <a:r>
+              <a:rPr lang="en-GB" dirty="0" smtClean="0"/>
+              <a:t>distribution. Because it is the basis of many tests (parametric tests such as </a:t>
+            </a:r>
+            <a:r>
+              <a:rPr lang="en-GB" i="1" dirty="0" smtClean="0"/>
+              <a:t>t</a:t>
+            </a:r>
+            <a:r>
+              <a:rPr lang="en-GB" dirty="0" smtClean="0"/>
+              <a:t>-test, regression and ANOVA) </a:t>
+            </a:r>
+          </a:p>
+          <a:p>
+            <a:pPr lvl="1"/>
+            <a:r>
+              <a:rPr lang="en-GB" dirty="0" smtClean="0"/>
+              <a:t>Properties of normal distributions</a:t>
+            </a:r>
+          </a:p>
+          <a:p>
+            <a:pPr lvl="1"/>
+            <a:r>
+              <a:rPr lang="en-GB" dirty="0" smtClean="0"/>
+              <a:t>Sampling distribution of the mean and the standard error</a:t>
+            </a:r>
+            <a:endParaRPr lang="en-GB" dirty="0" smtClean="0"/>
+          </a:p>
+          <a:p>
+            <a:pPr lvl="1"/>
+            <a:r>
+              <a:rPr lang="en-GB" dirty="0" smtClean="0"/>
+              <a:t>Confidence intervals </a:t>
+            </a:r>
+            <a:endParaRPr lang="en-GB" dirty="0" smtClean="0"/>
+          </a:p>
+          <a:p>
+            <a:r>
+              <a:rPr lang="en-GB" dirty="0" smtClean="0"/>
+              <a:t>In RStudio </a:t>
+            </a:r>
+            <a:endParaRPr lang="en-GB" dirty="0" smtClean="0"/>
+          </a:p>
+          <a:p>
+            <a:pPr lvl="1"/>
+            <a:r>
+              <a:rPr lang="en-GB" dirty="0" smtClean="0"/>
+              <a:t>Calculate </a:t>
+            </a:r>
+            <a:r>
+              <a:rPr lang="en-GB" dirty="0"/>
+              <a:t>probabilities and quantiles from normal </a:t>
+            </a:r>
+            <a:r>
+              <a:rPr lang="en-GB" dirty="0" smtClean="0"/>
+              <a:t>distributions</a:t>
+            </a:r>
+          </a:p>
+          <a:p>
+            <a:pPr lvl="1"/>
+            <a:r>
+              <a:rPr lang="en-GB" dirty="0" smtClean="0"/>
+              <a:t>Calculate confidence intervals</a:t>
+            </a:r>
+            <a:endParaRPr lang="en-GB" dirty="0"/>
+          </a:p>
+        </p:txBody>
+      </p:sp>
+      <p:sp>
+        <p:nvSpPr>
+          <p:cNvPr id="4" name="Slide Number Placeholder 3"/>
+          <p:cNvSpPr>
+            <a:spLocks noGrp="1"/>
+          </p:cNvSpPr>
+          <p:nvPr>
+            <p:ph type="sldNum" sz="quarter" idx="12"/>
+          </p:nvPr>
+        </p:nvSpPr>
+        <p:spPr/>
+        <p:txBody>
+          <a:bodyPr/>
+          <a:lstStyle/>
+          <a:p>
+            <a:fld id="{B6F15528-21DE-4FAA-801E-634DDDAF4B2B}" type="slidenum">
+              <a:rPr lang="en-US" smtClean="0"/>
+              <a:pPr/>
+              <a:t>3</a:t>
+            </a:fld>
+            <a:endParaRPr lang="en-US"/>
+          </a:p>
+        </p:txBody>
+      </p:sp>
+    </p:spTree>
+    <p:extLst>
+      <p:ext uri="{BB962C8B-B14F-4D97-AF65-F5344CB8AC3E}">
+        <p14:creationId xmlns:p14="http://schemas.microsoft.com/office/powerpoint/2010/main" val="2777404455"/>
+      </p:ext>
+    </p:extLst>
+  </p:cSld>
+  <p:clrMapOvr>
+    <a:masterClrMapping/>
+  </p:clrMapOvr>
+  <p:timing>
+    <p:tnLst>
+      <p:par>
+        <p:cTn id="1" dur="indefinite" restart="never" nodeType="tmRoot"/>
+      </p:par>
+    </p:tnLst>
+  </p:timing>
+</p:sld>
+</file>
+
+<file path=ppt/slides/slide30.xml><?xml version="1.0" encoding="utf-8"?>
 <p:sld xmlns:a="http://schemas.openxmlformats.org/drawingml/2006/main" xmlns:r="http://schemas.openxmlformats.org/officeDocument/2006/relationships" xmlns:p="http://schemas.openxmlformats.org/presentationml/2006/main">
   <p:cSld>
     <p:spTree>
@@ -19818,7 +20113,7 @@
               <a:pPr>
                 <a:defRPr/>
               </a:pPr>
-              <a:t>29</a:t>
+              <a:t>30</a:t>
             </a:fld>
             <a:endParaRPr lang="en-GB"/>
           </a:p>
@@ -19940,184 +20235,7 @@
 </p:sld>
 </file>
 
-<file path=ppt/slides/slide3.xml><?xml version="1.0" encoding="utf-8"?>
-<p:sld xmlns:a="http://schemas.openxmlformats.org/drawingml/2006/main" xmlns:r="http://schemas.openxmlformats.org/officeDocument/2006/relationships" xmlns:p="http://schemas.openxmlformats.org/presentationml/2006/main">
-  <p:cSld>
-    <p:spTree>
-      <p:nvGrpSpPr>
-        <p:cNvPr id="1" name=""/>
-        <p:cNvGrpSpPr/>
-        <p:nvPr/>
-      </p:nvGrpSpPr>
-      <p:grpSpPr>
-        <a:xfrm>
-          <a:off x="0" y="0"/>
-          <a:ext cx="0" cy="0"/>
-          <a:chOff x="0" y="0"/>
-          <a:chExt cx="0" cy="0"/>
-        </a:xfrm>
-      </p:grpSpPr>
-      <p:sp>
-        <p:nvSpPr>
-          <p:cNvPr id="2" name="Title 1"/>
-          <p:cNvSpPr>
-            <a:spLocks noGrp="1"/>
-          </p:cNvSpPr>
-          <p:nvPr>
-            <p:ph type="title"/>
-          </p:nvPr>
-        </p:nvSpPr>
-        <p:spPr/>
-        <p:txBody>
-          <a:bodyPr/>
-          <a:lstStyle/>
-          <a:p>
-            <a:r>
-              <a:rPr lang="en-GB" dirty="0" smtClean="0"/>
-              <a:t>Summary of this week</a:t>
-            </a:r>
-            <a:endParaRPr lang="en-GB" dirty="0"/>
-          </a:p>
-        </p:txBody>
-      </p:sp>
-      <p:sp>
-        <p:nvSpPr>
-          <p:cNvPr id="3" name="Content Placeholder 2"/>
-          <p:cNvSpPr>
-            <a:spLocks noGrp="1"/>
-          </p:cNvSpPr>
-          <p:nvPr>
-            <p:ph idx="1"/>
-          </p:nvPr>
-        </p:nvSpPr>
-        <p:spPr/>
-        <p:txBody>
-          <a:bodyPr>
-            <a:normAutofit fontScale="92500" lnSpcReduction="20000"/>
-          </a:bodyPr>
-          <a:lstStyle/>
-          <a:p>
-            <a:r>
-              <a:rPr lang="en-GB" dirty="0" smtClean="0"/>
-              <a:t>Continuous variables: The </a:t>
-            </a:r>
-            <a:r>
-              <a:rPr lang="en-GB" dirty="0" smtClean="0"/>
-              <a:t>normal </a:t>
-            </a:r>
-            <a:r>
-              <a:rPr lang="en-GB" dirty="0" smtClean="0"/>
-              <a:t>distribution. Because it is the basis of many tests (parametric tests such as </a:t>
-            </a:r>
-            <a:r>
-              <a:rPr lang="en-GB" i="1" dirty="0" smtClean="0"/>
-              <a:t>t</a:t>
-            </a:r>
-            <a:r>
-              <a:rPr lang="en-GB" dirty="0" smtClean="0"/>
-              <a:t>-test, regression and ANOVA) </a:t>
-            </a:r>
-          </a:p>
-          <a:p>
-            <a:pPr lvl="1"/>
-            <a:r>
-              <a:rPr lang="en-GB" dirty="0" smtClean="0"/>
-              <a:t>Properties of normal distributions</a:t>
-            </a:r>
-          </a:p>
-          <a:p>
-            <a:pPr lvl="1"/>
-            <a:r>
-              <a:rPr lang="en-GB" dirty="0" smtClean="0"/>
-              <a:t>Sampling distribution of the mean and the standard error</a:t>
-            </a:r>
-            <a:endParaRPr lang="en-GB" dirty="0" smtClean="0"/>
-          </a:p>
-          <a:p>
-            <a:pPr lvl="1"/>
-            <a:r>
-              <a:rPr lang="en-GB" dirty="0" smtClean="0"/>
-              <a:t>Confidence intervals </a:t>
-            </a:r>
-            <a:endParaRPr lang="en-GB" dirty="0" smtClean="0"/>
-          </a:p>
-          <a:p>
-            <a:r>
-              <a:rPr lang="en-GB" dirty="0" smtClean="0"/>
-              <a:t>In RStudio </a:t>
-            </a:r>
-            <a:endParaRPr lang="en-GB" dirty="0" smtClean="0"/>
-          </a:p>
-          <a:p>
-            <a:pPr lvl="1"/>
-            <a:r>
-              <a:rPr lang="en-GB" dirty="0" smtClean="0"/>
-              <a:t>Calculate </a:t>
-            </a:r>
-            <a:r>
-              <a:rPr lang="en-GB" dirty="0"/>
-              <a:t>probabilities and quantiles from normal </a:t>
-            </a:r>
-            <a:r>
-              <a:rPr lang="en-GB" dirty="0" smtClean="0"/>
-              <a:t>distributions</a:t>
-            </a:r>
-          </a:p>
-          <a:p>
-            <a:pPr lvl="1"/>
-            <a:r>
-              <a:rPr lang="en-GB" dirty="0" smtClean="0"/>
-              <a:t>Calculate confidence intervals</a:t>
-            </a:r>
-            <a:endParaRPr lang="en-GB" dirty="0"/>
-          </a:p>
-        </p:txBody>
-      </p:sp>
-      <p:sp>
-        <p:nvSpPr>
-          <p:cNvPr id="4" name="Slide Number Placeholder 3"/>
-          <p:cNvSpPr>
-            <a:spLocks noGrp="1"/>
-          </p:cNvSpPr>
-          <p:nvPr>
-            <p:ph type="sldNum" sz="quarter" idx="12"/>
-          </p:nvPr>
-        </p:nvSpPr>
-        <p:spPr/>
-        <p:txBody>
-          <a:bodyPr/>
-          <a:lstStyle/>
-          <a:p>
-            <a:fld id="{B6F15528-21DE-4FAA-801E-634DDDAF4B2B}" type="slidenum">
-              <a:rPr lang="en-US" smtClean="0"/>
-              <a:pPr/>
-              <a:t>3</a:t>
-            </a:fld>
-            <a:endParaRPr lang="en-US"/>
-          </a:p>
-        </p:txBody>
-      </p:sp>
-    </p:spTree>
-    <p:extLst>
-      <p:ext uri="{BB962C8B-B14F-4D97-AF65-F5344CB8AC3E}">
-        <p14:creationId xmlns:p14="http://schemas.microsoft.com/office/powerpoint/2010/main" val="2777404455"/>
-      </p:ext>
-    </p:extLst>
-  </p:cSld>
-  <p:clrMapOvr>
-    <a:masterClrMapping/>
-  </p:clrMapOvr>
-  <p:timing>
-    <p:tnLst>
-      <p:par>
-        <p:cTn id="1" dur="indefinite" restart="never" nodeType="tmRoot"/>
-      </p:par>
-    </p:tnLst>
-  </p:timing>
-</p:sld>
-</file>
-
-<file path=ppt/slides/slide30.xml><?xml version="1.0" encoding="utf-8"?>
+<file path=ppt/slides/slide31.xml><?xml version="1.0" encoding="utf-8"?>
 <p:sld xmlns:a="http://schemas.openxmlformats.org/drawingml/2006/main" xmlns:r="http://schemas.openxmlformats.org/officeDocument/2006/relationships" xmlns:p="http://schemas.openxmlformats.org/presentationml/2006/main">
   <p:cSld>
     <p:spTree>
@@ -20263,7 +20381,7 @@
               <a:pPr>
                 <a:defRPr/>
               </a:pPr>
-              <a:t>30</a:t>
+              <a:t>31</a:t>
             </a:fld>
             <a:endParaRPr lang="en-GB"/>
           </a:p>
@@ -20386,428 +20504,6 @@
     <p:extLst>
       <p:ext uri="{BB962C8B-B14F-4D97-AF65-F5344CB8AC3E}">
         <p14:creationId xmlns:p14="http://schemas.microsoft.com/office/powerpoint/2010/main" val="446635743"/>
-      </p:ext>
-    </p:extLst>
-  </p:cSld>
-  <p:clrMapOvr>
-    <a:masterClrMapping/>
-  </p:clrMapOvr>
-  <mc:AlternateContent xmlns:mc="http://schemas.openxmlformats.org/markup-compatibility/2006" xmlns:p14="http://schemas.microsoft.com/office/powerpoint/2010/main">
-    <mc:Choice Requires="p14">
-      <p:transition spd="slow" p14:dur="2000"/>
-    </mc:Choice>
-    <mc:Fallback xmlns="">
-      <p:transition spd="slow"/>
-    </mc:Fallback>
-  </mc:AlternateContent>
-  <p:timing>
-    <p:tnLst>
-      <p:par>
-        <p:cTn id="1" dur="indefinite" restart="never" nodeType="tmRoot"/>
-      </p:par>
-    </p:tnLst>
-  </p:timing>
-</p:sld>
-</file>
-
-<file path=ppt/slides/slide31.xml><?xml version="1.0" encoding="utf-8"?>
-<p:sld xmlns:a="http://schemas.openxmlformats.org/drawingml/2006/main" xmlns:r="http://schemas.openxmlformats.org/officeDocument/2006/relationships" xmlns:p="http://schemas.openxmlformats.org/presentationml/2006/main">
-  <p:cSld>
-    <p:spTree>
-      <p:nvGrpSpPr>
-        <p:cNvPr id="1" name=""/>
-        <p:cNvGrpSpPr/>
-        <p:nvPr/>
-      </p:nvGrpSpPr>
-      <p:grpSpPr>
-        <a:xfrm>
-          <a:off x="0" y="0"/>
-          <a:ext cx="0" cy="0"/>
-          <a:chOff x="0" y="0"/>
-          <a:chExt cx="0" cy="0"/>
-        </a:xfrm>
-      </p:grpSpPr>
-      <p:pic>
-        <p:nvPicPr>
-          <p:cNvPr id="50180" name="Picture 2"/>
-          <p:cNvPicPr>
-            <a:picLocks noChangeAspect="1" noChangeArrowheads="1"/>
-          </p:cNvPicPr>
-          <p:nvPr/>
-        </p:nvPicPr>
-        <p:blipFill>
-          <a:blip r:embed="rId3" cstate="print">
-            <a:extLst>
-              <a:ext uri="{28A0092B-C50C-407E-A947-70E740481C1C}">
-                <a14:useLocalDpi xmlns:a14="http://schemas.microsoft.com/office/drawing/2010/main" val="0"/>
-              </a:ext>
-            </a:extLst>
-          </a:blip>
-          <a:srcRect l="10576" t="13123" r="6110"/>
-          <a:stretch>
-            <a:fillRect/>
-          </a:stretch>
-        </p:blipFill>
-        <p:spPr bwMode="auto">
-          <a:xfrm>
-            <a:off x="1470488" y="1310875"/>
-            <a:ext cx="7377088" cy="3794526"/>
-          </a:xfrm>
-          <a:prstGeom prst="rect">
-            <a:avLst/>
-          </a:prstGeom>
-          <a:noFill/>
-          <a:ln>
-            <a:noFill/>
-          </a:ln>
-          <a:extLst>
-            <a:ext uri="{909E8E84-426E-40DD-AFC4-6F175D3DCCD1}">
-              <a14:hiddenFill xmlns:a14="http://schemas.microsoft.com/office/drawing/2010/main">
-                <a:solidFill>
-                  <a:schemeClr val="accent1"/>
-                </a:solidFill>
-              </a14:hiddenFill>
-            </a:ext>
-            <a:ext uri="{91240B29-F687-4F45-9708-019B960494DF}">
-              <a14:hiddenLine xmlns:a14="http://schemas.microsoft.com/office/drawing/2010/main" w="9525">
-                <a:solidFill>
-                  <a:schemeClr val="tx1"/>
-                </a:solidFill>
-                <a:miter lim="800000"/>
-                <a:headEnd/>
-                <a:tailEnd/>
-              </a14:hiddenLine>
-            </a:ext>
-          </a:extLst>
-        </p:spPr>
-      </p:pic>
-      <p:sp>
-        <p:nvSpPr>
-          <p:cNvPr id="4" name="Slide Number Placeholder 3"/>
-          <p:cNvSpPr>
-            <a:spLocks noGrp="1"/>
-          </p:cNvSpPr>
-          <p:nvPr>
-            <p:ph type="sldNum" sz="quarter" idx="12"/>
-          </p:nvPr>
-        </p:nvSpPr>
-        <p:spPr/>
-        <p:txBody>
-          <a:bodyPr/>
-          <a:lstStyle/>
-          <a:p>
-            <a:pPr>
-              <a:defRPr/>
-            </a:pPr>
-            <a:fld id="{7F41BB30-E323-4BD5-9083-BE6972CAAC87}" type="slidenum">
-              <a:rPr lang="en-GB" smtClean="0"/>
-              <a:pPr>
-                <a:defRPr/>
-              </a:pPr>
-              <a:t>31</a:t>
-            </a:fld>
-            <a:endParaRPr lang="en-GB"/>
-          </a:p>
-        </p:txBody>
-      </p:sp>
-      <p:sp>
-        <p:nvSpPr>
-          <p:cNvPr id="9" name="Title 1"/>
-          <p:cNvSpPr txBox="1">
-            <a:spLocks/>
-          </p:cNvSpPr>
-          <p:nvPr/>
-        </p:nvSpPr>
-        <p:spPr>
-          <a:xfrm>
-            <a:off x="457200" y="304800"/>
-            <a:ext cx="8229600" cy="1143000"/>
-          </a:xfrm>
-          <a:prstGeom prst="rect">
-            <a:avLst/>
-          </a:prstGeom>
-        </p:spPr>
-        <p:txBody>
-          <a:bodyPr>
-            <a:noAutofit/>
-          </a:bodyPr>
-          <a:lstStyle>
-            <a:lvl1pPr algn="ctr" defTabSz="914400" rtl="0" eaLnBrk="1" latinLnBrk="0" hangingPunct="1">
-              <a:spcBef>
-                <a:spcPct val="0"/>
-              </a:spcBef>
-              <a:buNone/>
-              <a:defRPr sz="4400" kern="1200">
-                <a:solidFill>
-                  <a:schemeClr val="tx1"/>
-                </a:solidFill>
-                <a:latin typeface="+mj-lt"/>
-                <a:ea typeface="+mj-ea"/>
-                <a:cs typeface="+mj-cs"/>
-              </a:defRPr>
-            </a:lvl1pPr>
-          </a:lstStyle>
-          <a:p>
-            <a:r>
-              <a:rPr lang="en-GB" dirty="0" smtClean="0"/>
-              <a:t>Confidence </a:t>
-            </a:r>
-            <a:r>
-              <a:rPr lang="en-GB" dirty="0" smtClean="0"/>
-              <a:t>intervals: </a:t>
-            </a:r>
-            <a:r>
-              <a:rPr lang="en-GB" u="sng" dirty="0" smtClean="0"/>
-              <a:t>large samples</a:t>
-            </a:r>
-            <a:endParaRPr lang="en-GB" u="sng" dirty="0"/>
-          </a:p>
-        </p:txBody>
-      </p:sp>
-      <p:sp>
-        <p:nvSpPr>
-          <p:cNvPr id="10" name="Title 1"/>
-          <p:cNvSpPr txBox="1">
-            <a:spLocks/>
-          </p:cNvSpPr>
-          <p:nvPr/>
-        </p:nvSpPr>
-        <p:spPr>
-          <a:xfrm>
-            <a:off x="273205" y="1575166"/>
-            <a:ext cx="2393795" cy="773370"/>
-          </a:xfrm>
-          <a:prstGeom prst="rect">
-            <a:avLst/>
-          </a:prstGeom>
-        </p:spPr>
-        <p:txBody>
-          <a:bodyPr>
-            <a:noAutofit/>
-          </a:bodyPr>
-          <a:lstStyle>
-            <a:lvl1pPr algn="ctr" defTabSz="914400" rtl="0" eaLnBrk="1" latinLnBrk="0" hangingPunct="1">
-              <a:spcBef>
-                <a:spcPct val="0"/>
-              </a:spcBef>
-              <a:buNone/>
-              <a:defRPr sz="4400" kern="1200">
-                <a:solidFill>
-                  <a:schemeClr val="tx1"/>
-                </a:solidFill>
-                <a:latin typeface="+mj-lt"/>
-                <a:ea typeface="+mj-ea"/>
-                <a:cs typeface="+mj-cs"/>
-              </a:defRPr>
-            </a:lvl1pPr>
-          </a:lstStyle>
-          <a:p>
-            <a:pPr algn="l"/>
-            <a:r>
-              <a:rPr lang="en-GB" sz="3200" dirty="0" err="1" smtClean="0"/>
-              <a:t>pnorm</a:t>
-            </a:r>
-            <a:r>
-              <a:rPr lang="en-GB" sz="3200" dirty="0" smtClean="0"/>
-              <a:t>(x)</a:t>
-            </a:r>
-            <a:endParaRPr lang="en-GB" sz="3200" u="sng" dirty="0"/>
-          </a:p>
-        </p:txBody>
-      </p:sp>
-      <p:sp>
-        <p:nvSpPr>
-          <p:cNvPr id="13" name="Title 1"/>
-          <p:cNvSpPr txBox="1">
-            <a:spLocks/>
-          </p:cNvSpPr>
-          <p:nvPr/>
-        </p:nvSpPr>
-        <p:spPr>
-          <a:xfrm>
-            <a:off x="240967" y="5560524"/>
-            <a:ext cx="4864433" cy="773370"/>
-          </a:xfrm>
-          <a:prstGeom prst="rect">
-            <a:avLst/>
-          </a:prstGeom>
-        </p:spPr>
-        <p:txBody>
-          <a:bodyPr>
-            <a:noAutofit/>
-          </a:bodyPr>
-          <a:lstStyle>
-            <a:lvl1pPr algn="ctr" defTabSz="914400" rtl="0" eaLnBrk="1" latinLnBrk="0" hangingPunct="1">
-              <a:spcBef>
-                <a:spcPct val="0"/>
-              </a:spcBef>
-              <a:buNone/>
-              <a:defRPr sz="4400" kern="1200">
-                <a:solidFill>
-                  <a:schemeClr val="tx1"/>
-                </a:solidFill>
-                <a:latin typeface="+mj-lt"/>
-                <a:ea typeface="+mj-ea"/>
-                <a:cs typeface="+mj-cs"/>
-              </a:defRPr>
-            </a:lvl1pPr>
-          </a:lstStyle>
-          <a:p>
-            <a:pPr algn="l"/>
-            <a:r>
-              <a:rPr lang="en-GB" sz="3200" dirty="0" smtClean="0"/>
-              <a:t>Returns probability</a:t>
-            </a:r>
-            <a:endParaRPr lang="en-GB" sz="3200" u="sng" dirty="0"/>
-          </a:p>
-        </p:txBody>
-      </p:sp>
-      <p:sp>
-        <p:nvSpPr>
-          <p:cNvPr id="3" name="Down Arrow 2"/>
-          <p:cNvSpPr/>
-          <p:nvPr/>
-        </p:nvSpPr>
-        <p:spPr>
-          <a:xfrm rot="10800000">
-            <a:off x="7250722" y="4724400"/>
-            <a:ext cx="445477" cy="1120468"/>
-          </a:xfrm>
-          <a:prstGeom prst="downArrow">
-            <a:avLst>
-              <a:gd name="adj1" fmla="val 31111"/>
-              <a:gd name="adj2" fmla="val 50000"/>
-            </a:avLst>
-          </a:prstGeom>
-        </p:spPr>
-        <p:style>
-          <a:lnRef idx="2">
-            <a:schemeClr val="accent1">
-              <a:shade val="50000"/>
-            </a:schemeClr>
-          </a:lnRef>
-          <a:fillRef idx="1">
-            <a:schemeClr val="accent1"/>
-          </a:fillRef>
-          <a:effectRef idx="0">
-            <a:schemeClr val="accent1"/>
-          </a:effectRef>
-          <a:fontRef idx="minor">
-            <a:schemeClr val="lt1"/>
-          </a:fontRef>
-        </p:style>
-        <p:txBody>
-          <a:bodyPr rtlCol="0" anchor="ctr"/>
-          <a:lstStyle/>
-          <a:p>
-            <a:pPr algn="ctr"/>
-            <a:endParaRPr lang="en-GB"/>
-          </a:p>
-        </p:txBody>
-      </p:sp>
-      <p:sp>
-        <p:nvSpPr>
-          <p:cNvPr id="5" name="Right Arrow 4"/>
-          <p:cNvSpPr/>
-          <p:nvPr/>
-        </p:nvSpPr>
-        <p:spPr>
-          <a:xfrm rot="7285428">
-            <a:off x="2966630" y="4676289"/>
-            <a:ext cx="2522003" cy="219994"/>
-          </a:xfrm>
-          <a:prstGeom prst="rightArrow">
-            <a:avLst/>
-          </a:prstGeom>
-          <a:solidFill>
-            <a:schemeClr val="accent6">
-              <a:lumMod val="75000"/>
-            </a:schemeClr>
-          </a:solidFill>
-          <a:ln>
-            <a:solidFill>
-              <a:schemeClr val="accent6">
-                <a:lumMod val="75000"/>
-              </a:schemeClr>
-            </a:solidFill>
-          </a:ln>
-        </p:spPr>
-        <p:style>
-          <a:lnRef idx="2">
-            <a:schemeClr val="accent1">
-              <a:shade val="50000"/>
-            </a:schemeClr>
-          </a:lnRef>
-          <a:fillRef idx="1">
-            <a:schemeClr val="accent1"/>
-          </a:fillRef>
-          <a:effectRef idx="0">
-            <a:schemeClr val="accent1"/>
-          </a:effectRef>
-          <a:fontRef idx="minor">
-            <a:schemeClr val="lt1"/>
-          </a:fontRef>
-        </p:style>
-        <p:txBody>
-          <a:bodyPr rtlCol="0" anchor="ctr"/>
-          <a:lstStyle/>
-          <a:p>
-            <a:pPr algn="ctr"/>
-            <a:endParaRPr lang="en-GB"/>
-          </a:p>
-        </p:txBody>
-      </p:sp>
-      <p:sp>
-        <p:nvSpPr>
-          <p:cNvPr id="15" name="Title 1"/>
-          <p:cNvSpPr txBox="1">
-            <a:spLocks/>
-          </p:cNvSpPr>
-          <p:nvPr/>
-        </p:nvSpPr>
-        <p:spPr>
-          <a:xfrm>
-            <a:off x="7315200" y="5828264"/>
-            <a:ext cx="533400" cy="648736"/>
-          </a:xfrm>
-          <a:prstGeom prst="rect">
-            <a:avLst/>
-          </a:prstGeom>
-        </p:spPr>
-        <p:txBody>
-          <a:bodyPr>
-            <a:noAutofit/>
-          </a:bodyPr>
-          <a:lstStyle>
-            <a:lvl1pPr algn="ctr" defTabSz="914400" rtl="0" eaLnBrk="1" latinLnBrk="0" hangingPunct="1">
-              <a:spcBef>
-                <a:spcPct val="0"/>
-              </a:spcBef>
-              <a:buNone/>
-              <a:defRPr sz="4400" kern="1200">
-                <a:solidFill>
-                  <a:schemeClr val="tx1"/>
-                </a:solidFill>
-                <a:latin typeface="+mj-lt"/>
-                <a:ea typeface="+mj-ea"/>
-                <a:cs typeface="+mj-cs"/>
-              </a:defRPr>
-            </a:lvl1pPr>
-          </a:lstStyle>
-          <a:p>
-            <a:pPr algn="l"/>
-            <a:r>
-              <a:rPr lang="en-GB" sz="3200" dirty="0" smtClean="0"/>
-              <a:t>x</a:t>
-            </a:r>
-            <a:endParaRPr lang="en-GB" sz="3200" u="sng" dirty="0"/>
-          </a:p>
-        </p:txBody>
-      </p:sp>
-    </p:spTree>
-    <p:extLst>
-      <p:ext uri="{BB962C8B-B14F-4D97-AF65-F5344CB8AC3E}">
-        <p14:creationId xmlns:p14="http://schemas.microsoft.com/office/powerpoint/2010/main" val="1969296513"/>
       </p:ext>
     </p:extLst>
   </p:cSld>
@@ -20997,6 +20693,428 @@
         <p:spPr>
           <a:xfrm>
             <a:off x="273205" y="1575166"/>
+            <a:ext cx="2393795" cy="773370"/>
+          </a:xfrm>
+          <a:prstGeom prst="rect">
+            <a:avLst/>
+          </a:prstGeom>
+        </p:spPr>
+        <p:txBody>
+          <a:bodyPr>
+            <a:noAutofit/>
+          </a:bodyPr>
+          <a:lstStyle>
+            <a:lvl1pPr algn="ctr" defTabSz="914400" rtl="0" eaLnBrk="1" latinLnBrk="0" hangingPunct="1">
+              <a:spcBef>
+                <a:spcPct val="0"/>
+              </a:spcBef>
+              <a:buNone/>
+              <a:defRPr sz="4400" kern="1200">
+                <a:solidFill>
+                  <a:schemeClr val="tx1"/>
+                </a:solidFill>
+                <a:latin typeface="+mj-lt"/>
+                <a:ea typeface="+mj-ea"/>
+                <a:cs typeface="+mj-cs"/>
+              </a:defRPr>
+            </a:lvl1pPr>
+          </a:lstStyle>
+          <a:p>
+            <a:pPr algn="l"/>
+            <a:r>
+              <a:rPr lang="en-GB" sz="3200" dirty="0" err="1" smtClean="0"/>
+              <a:t>pnorm</a:t>
+            </a:r>
+            <a:r>
+              <a:rPr lang="en-GB" sz="3200" dirty="0" smtClean="0"/>
+              <a:t>(x)</a:t>
+            </a:r>
+            <a:endParaRPr lang="en-GB" sz="3200" u="sng" dirty="0"/>
+          </a:p>
+        </p:txBody>
+      </p:sp>
+      <p:sp>
+        <p:nvSpPr>
+          <p:cNvPr id="13" name="Title 1"/>
+          <p:cNvSpPr txBox="1">
+            <a:spLocks/>
+          </p:cNvSpPr>
+          <p:nvPr/>
+        </p:nvSpPr>
+        <p:spPr>
+          <a:xfrm>
+            <a:off x="240967" y="5560524"/>
+            <a:ext cx="4864433" cy="773370"/>
+          </a:xfrm>
+          <a:prstGeom prst="rect">
+            <a:avLst/>
+          </a:prstGeom>
+        </p:spPr>
+        <p:txBody>
+          <a:bodyPr>
+            <a:noAutofit/>
+          </a:bodyPr>
+          <a:lstStyle>
+            <a:lvl1pPr algn="ctr" defTabSz="914400" rtl="0" eaLnBrk="1" latinLnBrk="0" hangingPunct="1">
+              <a:spcBef>
+                <a:spcPct val="0"/>
+              </a:spcBef>
+              <a:buNone/>
+              <a:defRPr sz="4400" kern="1200">
+                <a:solidFill>
+                  <a:schemeClr val="tx1"/>
+                </a:solidFill>
+                <a:latin typeface="+mj-lt"/>
+                <a:ea typeface="+mj-ea"/>
+                <a:cs typeface="+mj-cs"/>
+              </a:defRPr>
+            </a:lvl1pPr>
+          </a:lstStyle>
+          <a:p>
+            <a:pPr algn="l"/>
+            <a:r>
+              <a:rPr lang="en-GB" sz="3200" dirty="0" smtClean="0"/>
+              <a:t>Returns probability</a:t>
+            </a:r>
+            <a:endParaRPr lang="en-GB" sz="3200" u="sng" dirty="0"/>
+          </a:p>
+        </p:txBody>
+      </p:sp>
+      <p:sp>
+        <p:nvSpPr>
+          <p:cNvPr id="3" name="Down Arrow 2"/>
+          <p:cNvSpPr/>
+          <p:nvPr/>
+        </p:nvSpPr>
+        <p:spPr>
+          <a:xfrm rot="10800000">
+            <a:off x="7250722" y="4724400"/>
+            <a:ext cx="445477" cy="1120468"/>
+          </a:xfrm>
+          <a:prstGeom prst="downArrow">
+            <a:avLst>
+              <a:gd name="adj1" fmla="val 31111"/>
+              <a:gd name="adj2" fmla="val 50000"/>
+            </a:avLst>
+          </a:prstGeom>
+        </p:spPr>
+        <p:style>
+          <a:lnRef idx="2">
+            <a:schemeClr val="accent1">
+              <a:shade val="50000"/>
+            </a:schemeClr>
+          </a:lnRef>
+          <a:fillRef idx="1">
+            <a:schemeClr val="accent1"/>
+          </a:fillRef>
+          <a:effectRef idx="0">
+            <a:schemeClr val="accent1"/>
+          </a:effectRef>
+          <a:fontRef idx="minor">
+            <a:schemeClr val="lt1"/>
+          </a:fontRef>
+        </p:style>
+        <p:txBody>
+          <a:bodyPr rtlCol="0" anchor="ctr"/>
+          <a:lstStyle/>
+          <a:p>
+            <a:pPr algn="ctr"/>
+            <a:endParaRPr lang="en-GB"/>
+          </a:p>
+        </p:txBody>
+      </p:sp>
+      <p:sp>
+        <p:nvSpPr>
+          <p:cNvPr id="5" name="Right Arrow 4"/>
+          <p:cNvSpPr/>
+          <p:nvPr/>
+        </p:nvSpPr>
+        <p:spPr>
+          <a:xfrm rot="7285428">
+            <a:off x="2966630" y="4676289"/>
+            <a:ext cx="2522003" cy="219994"/>
+          </a:xfrm>
+          <a:prstGeom prst="rightArrow">
+            <a:avLst/>
+          </a:prstGeom>
+          <a:solidFill>
+            <a:schemeClr val="accent6">
+              <a:lumMod val="75000"/>
+            </a:schemeClr>
+          </a:solidFill>
+          <a:ln>
+            <a:solidFill>
+              <a:schemeClr val="accent6">
+                <a:lumMod val="75000"/>
+              </a:schemeClr>
+            </a:solidFill>
+          </a:ln>
+        </p:spPr>
+        <p:style>
+          <a:lnRef idx="2">
+            <a:schemeClr val="accent1">
+              <a:shade val="50000"/>
+            </a:schemeClr>
+          </a:lnRef>
+          <a:fillRef idx="1">
+            <a:schemeClr val="accent1"/>
+          </a:fillRef>
+          <a:effectRef idx="0">
+            <a:schemeClr val="accent1"/>
+          </a:effectRef>
+          <a:fontRef idx="minor">
+            <a:schemeClr val="lt1"/>
+          </a:fontRef>
+        </p:style>
+        <p:txBody>
+          <a:bodyPr rtlCol="0" anchor="ctr"/>
+          <a:lstStyle/>
+          <a:p>
+            <a:pPr algn="ctr"/>
+            <a:endParaRPr lang="en-GB"/>
+          </a:p>
+        </p:txBody>
+      </p:sp>
+      <p:sp>
+        <p:nvSpPr>
+          <p:cNvPr id="15" name="Title 1"/>
+          <p:cNvSpPr txBox="1">
+            <a:spLocks/>
+          </p:cNvSpPr>
+          <p:nvPr/>
+        </p:nvSpPr>
+        <p:spPr>
+          <a:xfrm>
+            <a:off x="7315200" y="5828264"/>
+            <a:ext cx="533400" cy="648736"/>
+          </a:xfrm>
+          <a:prstGeom prst="rect">
+            <a:avLst/>
+          </a:prstGeom>
+        </p:spPr>
+        <p:txBody>
+          <a:bodyPr>
+            <a:noAutofit/>
+          </a:bodyPr>
+          <a:lstStyle>
+            <a:lvl1pPr algn="ctr" defTabSz="914400" rtl="0" eaLnBrk="1" latinLnBrk="0" hangingPunct="1">
+              <a:spcBef>
+                <a:spcPct val="0"/>
+              </a:spcBef>
+              <a:buNone/>
+              <a:defRPr sz="4400" kern="1200">
+                <a:solidFill>
+                  <a:schemeClr val="tx1"/>
+                </a:solidFill>
+                <a:latin typeface="+mj-lt"/>
+                <a:ea typeface="+mj-ea"/>
+                <a:cs typeface="+mj-cs"/>
+              </a:defRPr>
+            </a:lvl1pPr>
+          </a:lstStyle>
+          <a:p>
+            <a:pPr algn="l"/>
+            <a:r>
+              <a:rPr lang="en-GB" sz="3200" dirty="0" smtClean="0"/>
+              <a:t>x</a:t>
+            </a:r>
+            <a:endParaRPr lang="en-GB" sz="3200" u="sng" dirty="0"/>
+          </a:p>
+        </p:txBody>
+      </p:sp>
+    </p:spTree>
+    <p:extLst>
+      <p:ext uri="{BB962C8B-B14F-4D97-AF65-F5344CB8AC3E}">
+        <p14:creationId xmlns:p14="http://schemas.microsoft.com/office/powerpoint/2010/main" val="1969296513"/>
+      </p:ext>
+    </p:extLst>
+  </p:cSld>
+  <p:clrMapOvr>
+    <a:masterClrMapping/>
+  </p:clrMapOvr>
+  <mc:AlternateContent xmlns:mc="http://schemas.openxmlformats.org/markup-compatibility/2006" xmlns:p14="http://schemas.microsoft.com/office/powerpoint/2010/main">
+    <mc:Choice Requires="p14">
+      <p:transition spd="slow" p14:dur="2000"/>
+    </mc:Choice>
+    <mc:Fallback xmlns="">
+      <p:transition spd="slow"/>
+    </mc:Fallback>
+  </mc:AlternateContent>
+  <p:timing>
+    <p:tnLst>
+      <p:par>
+        <p:cTn id="1" dur="indefinite" restart="never" nodeType="tmRoot"/>
+      </p:par>
+    </p:tnLst>
+  </p:timing>
+</p:sld>
+</file>
+
+<file path=ppt/slides/slide33.xml><?xml version="1.0" encoding="utf-8"?>
+<p:sld xmlns:a="http://schemas.openxmlformats.org/drawingml/2006/main" xmlns:r="http://schemas.openxmlformats.org/officeDocument/2006/relationships" xmlns:p="http://schemas.openxmlformats.org/presentationml/2006/main">
+  <p:cSld>
+    <p:spTree>
+      <p:nvGrpSpPr>
+        <p:cNvPr id="1" name=""/>
+        <p:cNvGrpSpPr/>
+        <p:nvPr/>
+      </p:nvGrpSpPr>
+      <p:grpSpPr>
+        <a:xfrm>
+          <a:off x="0" y="0"/>
+          <a:ext cx="0" cy="0"/>
+          <a:chOff x="0" y="0"/>
+          <a:chExt cx="0" cy="0"/>
+        </a:xfrm>
+      </p:grpSpPr>
+      <p:pic>
+        <p:nvPicPr>
+          <p:cNvPr id="50180" name="Picture 2"/>
+          <p:cNvPicPr>
+            <a:picLocks noChangeAspect="1" noChangeArrowheads="1"/>
+          </p:cNvPicPr>
+          <p:nvPr/>
+        </p:nvPicPr>
+        <p:blipFill>
+          <a:blip r:embed="rId3" cstate="print">
+            <a:extLst>
+              <a:ext uri="{28A0092B-C50C-407E-A947-70E740481C1C}">
+                <a14:useLocalDpi xmlns:a14="http://schemas.microsoft.com/office/drawing/2010/main" val="0"/>
+              </a:ext>
+            </a:extLst>
+          </a:blip>
+          <a:srcRect l="10576" t="13123" r="6110"/>
+          <a:stretch>
+            <a:fillRect/>
+          </a:stretch>
+        </p:blipFill>
+        <p:spPr bwMode="auto">
+          <a:xfrm>
+            <a:off x="1470488" y="1310875"/>
+            <a:ext cx="7377088" cy="3794526"/>
+          </a:xfrm>
+          <a:prstGeom prst="rect">
+            <a:avLst/>
+          </a:prstGeom>
+          <a:noFill/>
+          <a:ln>
+            <a:noFill/>
+          </a:ln>
+          <a:extLst>
+            <a:ext uri="{909E8E84-426E-40DD-AFC4-6F175D3DCCD1}">
+              <a14:hiddenFill xmlns:a14="http://schemas.microsoft.com/office/drawing/2010/main">
+                <a:solidFill>
+                  <a:schemeClr val="accent1"/>
+                </a:solidFill>
+              </a14:hiddenFill>
+            </a:ext>
+            <a:ext uri="{91240B29-F687-4F45-9708-019B960494DF}">
+              <a14:hiddenLine xmlns:a14="http://schemas.microsoft.com/office/drawing/2010/main" w="9525">
+                <a:solidFill>
+                  <a:schemeClr val="tx1"/>
+                </a:solidFill>
+                <a:miter lim="800000"/>
+                <a:headEnd/>
+                <a:tailEnd/>
+              </a14:hiddenLine>
+            </a:ext>
+          </a:extLst>
+        </p:spPr>
+      </p:pic>
+      <p:sp>
+        <p:nvSpPr>
+          <p:cNvPr id="4" name="Slide Number Placeholder 3"/>
+          <p:cNvSpPr>
+            <a:spLocks noGrp="1"/>
+          </p:cNvSpPr>
+          <p:nvPr>
+            <p:ph type="sldNum" sz="quarter" idx="12"/>
+          </p:nvPr>
+        </p:nvSpPr>
+        <p:spPr/>
+        <p:txBody>
+          <a:bodyPr/>
+          <a:lstStyle/>
+          <a:p>
+            <a:pPr>
+              <a:defRPr/>
+            </a:pPr>
+            <a:fld id="{7F41BB30-E323-4BD5-9083-BE6972CAAC87}" type="slidenum">
+              <a:rPr lang="en-GB" smtClean="0"/>
+              <a:pPr>
+                <a:defRPr/>
+              </a:pPr>
+              <a:t>33</a:t>
+            </a:fld>
+            <a:endParaRPr lang="en-GB"/>
+          </a:p>
+        </p:txBody>
+      </p:sp>
+      <p:sp>
+        <p:nvSpPr>
+          <p:cNvPr id="9" name="Title 1"/>
+          <p:cNvSpPr txBox="1">
+            <a:spLocks/>
+          </p:cNvSpPr>
+          <p:nvPr/>
+        </p:nvSpPr>
+        <p:spPr>
+          <a:xfrm>
+            <a:off x="457200" y="304800"/>
+            <a:ext cx="8229600" cy="1143000"/>
+          </a:xfrm>
+          <a:prstGeom prst="rect">
+            <a:avLst/>
+          </a:prstGeom>
+        </p:spPr>
+        <p:txBody>
+          <a:bodyPr>
+            <a:noAutofit/>
+          </a:bodyPr>
+          <a:lstStyle>
+            <a:lvl1pPr algn="ctr" defTabSz="914400" rtl="0" eaLnBrk="1" latinLnBrk="0" hangingPunct="1">
+              <a:spcBef>
+                <a:spcPct val="0"/>
+              </a:spcBef>
+              <a:buNone/>
+              <a:defRPr sz="4400" kern="1200">
+                <a:solidFill>
+                  <a:schemeClr val="tx1"/>
+                </a:solidFill>
+                <a:latin typeface="+mj-lt"/>
+                <a:ea typeface="+mj-ea"/>
+                <a:cs typeface="+mj-cs"/>
+              </a:defRPr>
+            </a:lvl1pPr>
+          </a:lstStyle>
+          <a:p>
+            <a:r>
+              <a:rPr lang="en-GB" dirty="0" smtClean="0"/>
+              <a:t>Confidence </a:t>
+            </a:r>
+            <a:r>
+              <a:rPr lang="en-GB" dirty="0" smtClean="0"/>
+              <a:t>intervals: </a:t>
+            </a:r>
+            <a:r>
+              <a:rPr lang="en-GB" u="sng" dirty="0" smtClean="0"/>
+              <a:t>large samples</a:t>
+            </a:r>
+            <a:endParaRPr lang="en-GB" u="sng" dirty="0"/>
+          </a:p>
+        </p:txBody>
+      </p:sp>
+      <p:sp>
+        <p:nvSpPr>
+          <p:cNvPr id="10" name="Title 1"/>
+          <p:cNvSpPr txBox="1">
+            <a:spLocks/>
+          </p:cNvSpPr>
+          <p:nvPr/>
+        </p:nvSpPr>
+        <p:spPr>
+          <a:xfrm>
+            <a:off x="273205" y="1575166"/>
             <a:ext cx="3536795" cy="773370"/>
           </a:xfrm>
           <a:prstGeom prst="rect">
@@ -21258,7 +21376,7 @@
 </p:sld>
 </file>
 
-<file path=ppt/slides/slide33.xml><?xml version="1.0" encoding="utf-8"?>
+<file path=ppt/slides/slide34.xml><?xml version="1.0" encoding="utf-8"?>
 <p:sld xmlns:a="http://schemas.openxmlformats.org/drawingml/2006/main" xmlns:r="http://schemas.openxmlformats.org/officeDocument/2006/relationships" xmlns:p="http://schemas.openxmlformats.org/presentationml/2006/main">
   <p:cSld>
     <p:spTree>
@@ -21345,7 +21463,7 @@
               <a:pPr>
                 <a:defRPr/>
               </a:pPr>
-              <a:t>33</a:t>
+              <a:t>34</a:t>
             </a:fld>
             <a:endParaRPr lang="en-GB"/>
           </a:p>
@@ -21604,7 +21722,7 @@
 </p:sld>
 </file>
 
-<file path=ppt/slides/slide34.xml><?xml version="1.0" encoding="utf-8"?>
+<file path=ppt/slides/slide35.xml><?xml version="1.0" encoding="utf-8"?>
 <p:sld xmlns:a="http://schemas.openxmlformats.org/drawingml/2006/main" xmlns:r="http://schemas.openxmlformats.org/officeDocument/2006/relationships" xmlns:p="http://schemas.openxmlformats.org/presentationml/2006/main">
   <p:cSld>
     <p:spTree>
@@ -21708,7 +21826,7 @@
               <a:pPr>
                 <a:defRPr/>
               </a:pPr>
-              <a:t>34</a:t>
+              <a:t>35</a:t>
             </a:fld>
             <a:endParaRPr lang="en-GB"/>
           </a:p>
@@ -22119,7 +22237,7 @@
 </p:sld>
 </file>
 
-<file path=ppt/slides/slide35.xml><?xml version="1.0" encoding="utf-8"?>
+<file path=ppt/slides/slide36.xml><?xml version="1.0" encoding="utf-8"?>
 <p:sld xmlns:a="http://schemas.openxmlformats.org/drawingml/2006/main" xmlns:r="http://schemas.openxmlformats.org/officeDocument/2006/relationships" xmlns:p="http://schemas.openxmlformats.org/presentationml/2006/main">
   <p:cSld>
     <p:spTree>
@@ -22441,7 +22559,7 @@
               <a:pPr>
                 <a:defRPr/>
               </a:pPr>
-              <a:t>35</a:t>
+              <a:t>36</a:t>
             </a:fld>
             <a:endParaRPr lang="en-GB"/>
           </a:p>
@@ -22583,7 +22701,7 @@
 </p:sld>
 </file>
 
-<file path=ppt/slides/slide36.xml><?xml version="1.0" encoding="utf-8"?>
+<file path=ppt/slides/slide37.xml><?xml version="1.0" encoding="utf-8"?>
 <p:sld xmlns:a="http://schemas.openxmlformats.org/drawingml/2006/main" xmlns:r="http://schemas.openxmlformats.org/officeDocument/2006/relationships" xmlns:p="http://schemas.openxmlformats.org/presentationml/2006/main">
   <p:cSld>
     <p:spTree>
@@ -22657,7 +22775,7 @@
               <a:pPr>
                 <a:defRPr/>
               </a:pPr>
-              <a:t>36</a:t>
+              <a:t>37</a:t>
             </a:fld>
             <a:endParaRPr lang="en-GB"/>
           </a:p>
@@ -22866,7 +22984,7 @@
 </p:sld>
 </file>
 
-<file path=ppt/slides/slide37.xml><?xml version="1.0" encoding="utf-8"?>
+<file path=ppt/slides/slide38.xml><?xml version="1.0" encoding="utf-8"?>
 <p:sld xmlns:a="http://schemas.openxmlformats.org/drawingml/2006/main" xmlns:r="http://schemas.openxmlformats.org/officeDocument/2006/relationships" xmlns:p="http://schemas.openxmlformats.org/presentationml/2006/main">
   <p:cSld>
     <p:spTree>
@@ -23794,7 +23912,7 @@
               <a:pPr>
                 <a:defRPr/>
               </a:pPr>
-              <a:t>37</a:t>
+              <a:t>38</a:t>
             </a:fld>
             <a:endParaRPr lang="en-GB" dirty="0"/>
           </a:p>
@@ -24375,7 +24493,7 @@
 </p:sld>
 </file>
 
-<file path=ppt/slides/slide38.xml><?xml version="1.0" encoding="utf-8"?>
+<file path=ppt/slides/slide39.xml><?xml version="1.0" encoding="utf-8"?>
 <p:sld xmlns:a="http://schemas.openxmlformats.org/drawingml/2006/main" xmlns:r="http://schemas.openxmlformats.org/officeDocument/2006/relationships" xmlns:p="http://schemas.openxmlformats.org/presentationml/2006/main">
   <p:cSld>
     <p:spTree>
@@ -24739,7 +24857,7 @@
               <a:pPr>
                 <a:defRPr/>
               </a:pPr>
-              <a:t>38</a:t>
+              <a:t>39</a:t>
             </a:fld>
             <a:endParaRPr lang="en-GB"/>
           </a:p>
@@ -24879,7 +24997,150 @@
 </p:sld>
 </file>
 
-<file path=ppt/slides/slide39.xml><?xml version="1.0" encoding="utf-8"?>
+<file path=ppt/slides/slide4.xml><?xml version="1.0" encoding="utf-8"?>
+<p:sld xmlns:a="http://schemas.openxmlformats.org/drawingml/2006/main" xmlns:r="http://schemas.openxmlformats.org/officeDocument/2006/relationships" xmlns:p="http://schemas.openxmlformats.org/presentationml/2006/main">
+  <p:cSld>
+    <p:spTree>
+      <p:nvGrpSpPr>
+        <p:cNvPr id="1" name=""/>
+        <p:cNvGrpSpPr/>
+        <p:nvPr/>
+      </p:nvGrpSpPr>
+      <p:grpSpPr>
+        <a:xfrm>
+          <a:off x="0" y="0"/>
+          <a:ext cx="0" cy="0"/>
+          <a:chOff x="0" y="0"/>
+          <a:chExt cx="0" cy="0"/>
+        </a:xfrm>
+      </p:grpSpPr>
+      <p:sp>
+        <p:nvSpPr>
+          <p:cNvPr id="2" name="Title 1"/>
+          <p:cNvSpPr>
+            <a:spLocks noGrp="1"/>
+          </p:cNvSpPr>
+          <p:nvPr>
+            <p:ph type="title"/>
+          </p:nvPr>
+        </p:nvSpPr>
+        <p:spPr/>
+        <p:txBody>
+          <a:bodyPr/>
+          <a:lstStyle/>
+          <a:p>
+            <a:r>
+              <a:rPr lang="en-GB" dirty="0" smtClean="0"/>
+              <a:t>Learning objectives for the week</a:t>
+            </a:r>
+            <a:endParaRPr lang="en-GB" dirty="0"/>
+          </a:p>
+        </p:txBody>
+      </p:sp>
+      <p:sp>
+        <p:nvSpPr>
+          <p:cNvPr id="3" name="Content Placeholder 2"/>
+          <p:cNvSpPr>
+            <a:spLocks noGrp="1"/>
+          </p:cNvSpPr>
+          <p:nvPr>
+            <p:ph idx="1"/>
+          </p:nvPr>
+        </p:nvSpPr>
+        <p:spPr/>
+        <p:txBody>
+          <a:bodyPr>
+            <a:normAutofit fontScale="85000" lnSpcReduction="20000"/>
+          </a:bodyPr>
+          <a:lstStyle/>
+          <a:p>
+            <a:pPr marL="0" indent="0">
+              <a:buNone/>
+            </a:pPr>
+            <a:r>
+              <a:rPr lang="en-US" dirty="0"/>
+              <a:t>By actively following the material and carrying out the independent study the successful student will be able to:</a:t>
+            </a:r>
+            <a:endParaRPr lang="en-GB" dirty="0"/>
+          </a:p>
+          <a:p>
+            <a:r>
+              <a:rPr lang="en-US" dirty="0"/>
+              <a:t>Explain the properties of ‘normal distributions’ (MLO 1 and 2)</a:t>
+            </a:r>
+          </a:p>
+          <a:p>
+            <a:r>
+              <a:rPr lang="en-US" dirty="0"/>
+              <a:t>Define the sampling distribution of the mean and the standard error (MLO 1 and 4)</a:t>
+            </a:r>
+          </a:p>
+          <a:p>
+            <a:r>
+              <a:rPr lang="en-US" dirty="0"/>
+              <a:t>Explain what a confidence interval is  (MLO 1 and 4)</a:t>
+            </a:r>
+          </a:p>
+          <a:p>
+            <a:r>
+              <a:rPr lang="en-US" dirty="0"/>
+              <a:t>Calculate probabilities and quantiles and in R (MLO 3 and 4)</a:t>
+            </a:r>
+          </a:p>
+          <a:p>
+            <a:r>
+              <a:rPr lang="en-US" dirty="0"/>
+              <a:t>Calculate confidence intervals for large and small samples in R  (MLO 3 and 4) </a:t>
+            </a:r>
+            <a:endParaRPr lang="en-GB" dirty="0" smtClean="0"/>
+          </a:p>
+        </p:txBody>
+      </p:sp>
+      <p:sp>
+        <p:nvSpPr>
+          <p:cNvPr id="4" name="Slide Number Placeholder 3"/>
+          <p:cNvSpPr>
+            <a:spLocks noGrp="1"/>
+          </p:cNvSpPr>
+          <p:nvPr>
+            <p:ph type="sldNum" sz="quarter" idx="12"/>
+          </p:nvPr>
+        </p:nvSpPr>
+        <p:spPr/>
+        <p:txBody>
+          <a:bodyPr/>
+          <a:lstStyle/>
+          <a:p>
+            <a:fld id="{B6F15528-21DE-4FAA-801E-634DDDAF4B2B}" type="slidenum">
+              <a:rPr lang="en-US" smtClean="0"/>
+              <a:pPr/>
+              <a:t>4</a:t>
+            </a:fld>
+            <a:endParaRPr lang="en-US"/>
+          </a:p>
+        </p:txBody>
+      </p:sp>
+    </p:spTree>
+    <p:extLst>
+      <p:ext uri="{BB962C8B-B14F-4D97-AF65-F5344CB8AC3E}">
+        <p14:creationId xmlns:p14="http://schemas.microsoft.com/office/powerpoint/2010/main" val="3010631801"/>
+      </p:ext>
+    </p:extLst>
+  </p:cSld>
+  <p:clrMapOvr>
+    <a:masterClrMapping/>
+  </p:clrMapOvr>
+  <p:timing>
+    <p:tnLst>
+      <p:par>
+        <p:cTn id="1" dur="indefinite" restart="never" nodeType="tmRoot"/>
+      </p:par>
+    </p:tnLst>
+  </p:timing>
+</p:sld>
+</file>
+
+<file path=ppt/slides/slide40.xml><?xml version="1.0" encoding="utf-8"?>
 <p:sld xmlns:a="http://schemas.openxmlformats.org/drawingml/2006/main" xmlns:r="http://schemas.openxmlformats.org/officeDocument/2006/relationships" xmlns:p="http://schemas.openxmlformats.org/presentationml/2006/main">
   <p:cSld>
     <p:spTree>
@@ -25257,7 +25518,7 @@
               <a:pPr>
                 <a:defRPr/>
               </a:pPr>
-              <a:t>39</a:t>
+              <a:t>40</a:t>
             </a:fld>
             <a:endParaRPr lang="en-GB"/>
           </a:p>
@@ -25404,150 +25665,7 @@
 </p:sld>
 </file>
 
-<file path=ppt/slides/slide4.xml><?xml version="1.0" encoding="utf-8"?>
-<p:sld xmlns:a="http://schemas.openxmlformats.org/drawingml/2006/main" xmlns:r="http://schemas.openxmlformats.org/officeDocument/2006/relationships" xmlns:p="http://schemas.openxmlformats.org/presentationml/2006/main">
-  <p:cSld>
-    <p:spTree>
-      <p:nvGrpSpPr>
-        <p:cNvPr id="1" name=""/>
-        <p:cNvGrpSpPr/>
-        <p:nvPr/>
-      </p:nvGrpSpPr>
-      <p:grpSpPr>
-        <a:xfrm>
-          <a:off x="0" y="0"/>
-          <a:ext cx="0" cy="0"/>
-          <a:chOff x="0" y="0"/>
-          <a:chExt cx="0" cy="0"/>
-        </a:xfrm>
-      </p:grpSpPr>
-      <p:sp>
-        <p:nvSpPr>
-          <p:cNvPr id="2" name="Title 1"/>
-          <p:cNvSpPr>
-            <a:spLocks noGrp="1"/>
-          </p:cNvSpPr>
-          <p:nvPr>
-            <p:ph type="title"/>
-          </p:nvPr>
-        </p:nvSpPr>
-        <p:spPr/>
-        <p:txBody>
-          <a:bodyPr/>
-          <a:lstStyle/>
-          <a:p>
-            <a:r>
-              <a:rPr lang="en-GB" dirty="0" smtClean="0"/>
-              <a:t>Learning objectives for the week</a:t>
-            </a:r>
-            <a:endParaRPr lang="en-GB" dirty="0"/>
-          </a:p>
-        </p:txBody>
-      </p:sp>
-      <p:sp>
-        <p:nvSpPr>
-          <p:cNvPr id="3" name="Content Placeholder 2"/>
-          <p:cNvSpPr>
-            <a:spLocks noGrp="1"/>
-          </p:cNvSpPr>
-          <p:nvPr>
-            <p:ph idx="1"/>
-          </p:nvPr>
-        </p:nvSpPr>
-        <p:spPr/>
-        <p:txBody>
-          <a:bodyPr>
-            <a:normAutofit fontScale="85000" lnSpcReduction="20000"/>
-          </a:bodyPr>
-          <a:lstStyle/>
-          <a:p>
-            <a:pPr marL="0" indent="0">
-              <a:buNone/>
-            </a:pPr>
-            <a:r>
-              <a:rPr lang="en-US" dirty="0"/>
-              <a:t>By actively following the material and carrying out the independent study the successful student will be able to:</a:t>
-            </a:r>
-            <a:endParaRPr lang="en-GB" dirty="0"/>
-          </a:p>
-          <a:p>
-            <a:r>
-              <a:rPr lang="en-US" dirty="0"/>
-              <a:t>Explain the properties of ‘normal distributions’ (MLO 1 and 2)</a:t>
-            </a:r>
-          </a:p>
-          <a:p>
-            <a:r>
-              <a:rPr lang="en-US" dirty="0"/>
-              <a:t>Define the sampling distribution of the mean and the standard error (MLO 1 and 4)</a:t>
-            </a:r>
-          </a:p>
-          <a:p>
-            <a:r>
-              <a:rPr lang="en-US" dirty="0"/>
-              <a:t>Explain what a confidence interval is  (MLO 1 and 4)</a:t>
-            </a:r>
-          </a:p>
-          <a:p>
-            <a:r>
-              <a:rPr lang="en-US" dirty="0"/>
-              <a:t>Calculate probabilities and quantiles and in R (MLO 3 and 4)</a:t>
-            </a:r>
-          </a:p>
-          <a:p>
-            <a:r>
-              <a:rPr lang="en-US" dirty="0"/>
-              <a:t>Calculate confidence intervals for large and small samples in R  (MLO 3 and 4) </a:t>
-            </a:r>
-            <a:endParaRPr lang="en-GB" dirty="0" smtClean="0"/>
-          </a:p>
-        </p:txBody>
-      </p:sp>
-      <p:sp>
-        <p:nvSpPr>
-          <p:cNvPr id="4" name="Slide Number Placeholder 3"/>
-          <p:cNvSpPr>
-            <a:spLocks noGrp="1"/>
-          </p:cNvSpPr>
-          <p:nvPr>
-            <p:ph type="sldNum" sz="quarter" idx="12"/>
-          </p:nvPr>
-        </p:nvSpPr>
-        <p:spPr/>
-        <p:txBody>
-          <a:bodyPr/>
-          <a:lstStyle/>
-          <a:p>
-            <a:fld id="{B6F15528-21DE-4FAA-801E-634DDDAF4B2B}" type="slidenum">
-              <a:rPr lang="en-US" smtClean="0"/>
-              <a:pPr/>
-              <a:t>4</a:t>
-            </a:fld>
-            <a:endParaRPr lang="en-US"/>
-          </a:p>
-        </p:txBody>
-      </p:sp>
-    </p:spTree>
-    <p:extLst>
-      <p:ext uri="{BB962C8B-B14F-4D97-AF65-F5344CB8AC3E}">
-        <p14:creationId xmlns:p14="http://schemas.microsoft.com/office/powerpoint/2010/main" val="3010631801"/>
-      </p:ext>
-    </p:extLst>
-  </p:cSld>
-  <p:clrMapOvr>
-    <a:masterClrMapping/>
-  </p:clrMapOvr>
-  <p:timing>
-    <p:tnLst>
-      <p:par>
-        <p:cTn id="1" dur="indefinite" restart="never" nodeType="tmRoot"/>
-      </p:par>
-    </p:tnLst>
-  </p:timing>
-</p:sld>
-</file>
-
-<file path=ppt/slides/slide40.xml><?xml version="1.0" encoding="utf-8"?>
+<file path=ppt/slides/slide41.xml><?xml version="1.0" encoding="utf-8"?>
 <p:sld xmlns:a="http://schemas.openxmlformats.org/drawingml/2006/main" xmlns:r="http://schemas.openxmlformats.org/officeDocument/2006/relationships" xmlns:p="http://schemas.openxmlformats.org/presentationml/2006/main">
   <p:cSld>
     <p:spTree>
@@ -26454,7 +26572,7 @@
               <a:pPr>
                 <a:defRPr/>
               </a:pPr>
-              <a:t>40</a:t>
+              <a:t>41</a:t>
             </a:fld>
             <a:endParaRPr lang="en-GB"/>
           </a:p>
@@ -26525,278 +26643,6 @@
     <p:extLst>
       <p:ext uri="{BB962C8B-B14F-4D97-AF65-F5344CB8AC3E}">
         <p14:creationId xmlns:p14="http://schemas.microsoft.com/office/powerpoint/2010/main" val="582370159"/>
-      </p:ext>
-    </p:extLst>
-  </p:cSld>
-  <p:clrMapOvr>
-    <a:masterClrMapping/>
-  </p:clrMapOvr>
-  <mc:AlternateContent xmlns:mc="http://schemas.openxmlformats.org/markup-compatibility/2006" xmlns:p14="http://schemas.microsoft.com/office/powerpoint/2010/main">
-    <mc:Choice Requires="p14">
-      <p:transition spd="slow" p14:dur="2000"/>
-    </mc:Choice>
-    <mc:Fallback xmlns="">
-      <p:transition spd="slow"/>
-    </mc:Fallback>
-  </mc:AlternateContent>
-  <p:timing>
-    <p:tnLst>
-      <p:par>
-        <p:cTn id="1" dur="indefinite" restart="never" nodeType="tmRoot"/>
-      </p:par>
-    </p:tnLst>
-  </p:timing>
-</p:sld>
-</file>
-
-<file path=ppt/slides/slide41.xml><?xml version="1.0" encoding="utf-8"?>
-<p:sld xmlns:a="http://schemas.openxmlformats.org/drawingml/2006/main" xmlns:r="http://schemas.openxmlformats.org/officeDocument/2006/relationships" xmlns:p="http://schemas.openxmlformats.org/presentationml/2006/main">
-  <p:cSld>
-    <p:spTree>
-      <p:nvGrpSpPr>
-        <p:cNvPr id="1" name=""/>
-        <p:cNvGrpSpPr/>
-        <p:nvPr/>
-      </p:nvGrpSpPr>
-      <p:grpSpPr>
-        <a:xfrm>
-          <a:off x="0" y="0"/>
-          <a:ext cx="0" cy="0"/>
-          <a:chOff x="0" y="0"/>
-          <a:chExt cx="0" cy="0"/>
-        </a:xfrm>
-      </p:grpSpPr>
-      <p:sp>
-        <p:nvSpPr>
-          <p:cNvPr id="3" name="Content Placeholder 2"/>
-          <p:cNvSpPr>
-            <a:spLocks noGrp="1"/>
-          </p:cNvSpPr>
-          <p:nvPr>
-            <p:ph idx="1"/>
-          </p:nvPr>
-        </p:nvSpPr>
-        <p:spPr>
-          <a:xfrm>
-            <a:off x="395288" y="1773238"/>
-            <a:ext cx="8208962" cy="863600"/>
-          </a:xfrm>
-        </p:spPr>
-        <p:txBody>
-          <a:bodyPr>
-            <a:normAutofit fontScale="92500" lnSpcReduction="20000"/>
-          </a:bodyPr>
-          <a:lstStyle/>
-          <a:p>
-            <a:pPr marL="0" indent="0">
-              <a:buFont typeface="Wingdings" pitchFamily="2" charset="2"/>
-              <a:buNone/>
-              <a:defRPr/>
-            </a:pPr>
-            <a:r>
-              <a:rPr lang="en-GB" dirty="0" smtClean="0"/>
-              <a:t>19 lactate dehydrogenase solutions to a recipe that  </a:t>
-            </a:r>
-            <a:r>
-              <a:rPr lang="en-GB" u="sng" dirty="0" smtClean="0"/>
-              <a:t>should</a:t>
-            </a:r>
-            <a:r>
-              <a:rPr lang="en-GB" dirty="0" smtClean="0"/>
-              <a:t> yield a concentration of 1.5 </a:t>
-            </a:r>
-            <a:r>
-              <a:rPr lang="en-GB" dirty="0" err="1" smtClean="0"/>
-              <a:t>μmols</a:t>
-            </a:r>
-            <a:r>
-              <a:rPr lang="en-GB" dirty="0" smtClean="0"/>
-              <a:t> l</a:t>
-            </a:r>
-            <a:r>
-              <a:rPr lang="en-GB" baseline="30000" dirty="0" smtClean="0"/>
-              <a:t>-1</a:t>
-            </a:r>
-            <a:endParaRPr lang="en-GB" dirty="0" smtClean="0"/>
-          </a:p>
-          <a:p>
-            <a:pPr>
-              <a:defRPr/>
-            </a:pPr>
-            <a:endParaRPr lang="en-GB" dirty="0"/>
-          </a:p>
-        </p:txBody>
-      </p:sp>
-      <p:sp>
-        <p:nvSpPr>
-          <p:cNvPr id="4" name="Slide Number Placeholder 3"/>
-          <p:cNvSpPr>
-            <a:spLocks noGrp="1"/>
-          </p:cNvSpPr>
-          <p:nvPr>
-            <p:ph type="sldNum" sz="quarter" idx="12"/>
-          </p:nvPr>
-        </p:nvSpPr>
-        <p:spPr/>
-        <p:txBody>
-          <a:bodyPr/>
-          <a:lstStyle/>
-          <a:p>
-            <a:pPr>
-              <a:defRPr/>
-            </a:pPr>
-            <a:fld id="{3FE60194-DF1A-4E72-B163-601A563A2A37}" type="slidenum">
-              <a:rPr lang="en-GB" smtClean="0"/>
-              <a:pPr>
-                <a:defRPr/>
-              </a:pPr>
-              <a:t>41</a:t>
-            </a:fld>
-            <a:endParaRPr lang="en-GB"/>
-          </a:p>
-        </p:txBody>
-      </p:sp>
-      <p:pic>
-        <p:nvPicPr>
-          <p:cNvPr id="10246" name="Picture 6" descr="http://cem.com/e107_images/custom/students_lab.png"/>
-          <p:cNvPicPr>
-            <a:picLocks noChangeAspect="1" noChangeArrowheads="1"/>
-          </p:cNvPicPr>
-          <p:nvPr/>
-        </p:nvPicPr>
-        <p:blipFill>
-          <a:blip r:embed="rId2">
-            <a:extLst>
-              <a:ext uri="{28A0092B-C50C-407E-A947-70E740481C1C}">
-                <a14:useLocalDpi xmlns:a14="http://schemas.microsoft.com/office/drawing/2010/main" val="0"/>
-              </a:ext>
-            </a:extLst>
-          </a:blip>
-          <a:srcRect/>
-          <a:stretch>
-            <a:fillRect/>
-          </a:stretch>
-        </p:blipFill>
-        <p:spPr bwMode="auto">
-          <a:xfrm>
-            <a:off x="1752600" y="3048000"/>
-            <a:ext cx="4762500" cy="1971676"/>
-          </a:xfrm>
-          <a:prstGeom prst="rect">
-            <a:avLst/>
-          </a:prstGeom>
-          <a:noFill/>
-          <a:extLst>
-            <a:ext uri="{909E8E84-426E-40DD-AFC4-6F175D3DCCD1}">
-              <a14:hiddenFill xmlns:a14="http://schemas.microsoft.com/office/drawing/2010/main">
-                <a:solidFill>
-                  <a:srgbClr val="FFFFFF"/>
-                </a:solidFill>
-              </a14:hiddenFill>
-            </a:ext>
-          </a:extLst>
-        </p:spPr>
-      </p:pic>
-      <p:sp>
-        <p:nvSpPr>
-          <p:cNvPr id="7" name="Rectangle 6"/>
-          <p:cNvSpPr/>
-          <p:nvPr/>
-        </p:nvSpPr>
-        <p:spPr>
-          <a:xfrm>
-            <a:off x="457200" y="5465802"/>
-            <a:ext cx="8354888" cy="553998"/>
-          </a:xfrm>
-          <a:prstGeom prst="rect">
-            <a:avLst/>
-          </a:prstGeom>
-        </p:spPr>
-        <p:txBody>
-          <a:bodyPr wrap="square">
-            <a:spAutoFit/>
-          </a:bodyPr>
-          <a:lstStyle/>
-          <a:p>
-            <a:pPr>
-              <a:buClr>
-                <a:schemeClr val="tx1"/>
-              </a:buClr>
-              <a:buSzPct val="100000"/>
-              <a:defRPr/>
-            </a:pPr>
-            <a:r>
-              <a:rPr lang="en-GB" sz="3000" dirty="0"/>
-              <a:t>How good is the recipe/ability to follow the recipe?</a:t>
-            </a:r>
-          </a:p>
-        </p:txBody>
-      </p:sp>
-      <p:sp>
-        <p:nvSpPr>
-          <p:cNvPr id="8" name="Title 1"/>
-          <p:cNvSpPr txBox="1">
-            <a:spLocks/>
-          </p:cNvSpPr>
-          <p:nvPr/>
-        </p:nvSpPr>
-        <p:spPr>
-          <a:xfrm>
-            <a:off x="457200" y="274340"/>
-            <a:ext cx="8370887" cy="1143000"/>
-          </a:xfrm>
-          <a:prstGeom prst="rect">
-            <a:avLst/>
-          </a:prstGeom>
-        </p:spPr>
-        <p:txBody>
-          <a:bodyPr>
-            <a:noAutofit/>
-          </a:bodyPr>
-          <a:lstStyle>
-            <a:lvl1pPr algn="ctr" defTabSz="914400" rtl="0" eaLnBrk="1" latinLnBrk="0" hangingPunct="1">
-              <a:spcBef>
-                <a:spcPct val="0"/>
-              </a:spcBef>
-              <a:buNone/>
-              <a:defRPr sz="4400" kern="1200">
-                <a:solidFill>
-                  <a:schemeClr val="tx1"/>
-                </a:solidFill>
-                <a:latin typeface="+mj-lt"/>
-                <a:ea typeface="+mj-ea"/>
-                <a:cs typeface="+mj-cs"/>
-              </a:defRPr>
-            </a:lvl1pPr>
-          </a:lstStyle>
-          <a:p>
-            <a:r>
-              <a:rPr lang="en-GB" sz="2700" dirty="0" smtClean="0"/>
-              <a:t>The normal distribution</a:t>
-            </a:r>
-            <a:r>
-              <a:rPr lang="en-GB" dirty="0" smtClean="0"/>
-              <a:t/>
-            </a:r>
-            <a:br>
-              <a:rPr lang="en-GB" dirty="0" smtClean="0"/>
-            </a:br>
-            <a:r>
-              <a:rPr lang="en-GB" dirty="0" smtClean="0"/>
-              <a:t>Confidence intervals: </a:t>
-            </a:r>
-            <a:r>
-              <a:rPr lang="en-GB" u="sng" dirty="0" smtClean="0"/>
-              <a:t>small samples</a:t>
-            </a:r>
-            <a:endParaRPr lang="en-GB" u="sng" dirty="0"/>
-          </a:p>
-        </p:txBody>
-      </p:sp>
-    </p:spTree>
-    <p:extLst>
-      <p:ext uri="{BB962C8B-B14F-4D97-AF65-F5344CB8AC3E}">
-        <p14:creationId xmlns:p14="http://schemas.microsoft.com/office/powerpoint/2010/main" val="1537171718"/>
       </p:ext>
     </p:extLst>
   </p:cSld>
@@ -26901,6 +26747,278 @@
       </p:sp>
       <p:sp>
         <p:nvSpPr>
+          <p:cNvPr id="4" name="Slide Number Placeholder 3"/>
+          <p:cNvSpPr>
+            <a:spLocks noGrp="1"/>
+          </p:cNvSpPr>
+          <p:nvPr>
+            <p:ph type="sldNum" sz="quarter" idx="12"/>
+          </p:nvPr>
+        </p:nvSpPr>
+        <p:spPr/>
+        <p:txBody>
+          <a:bodyPr/>
+          <a:lstStyle/>
+          <a:p>
+            <a:pPr>
+              <a:defRPr/>
+            </a:pPr>
+            <a:fld id="{3FE60194-DF1A-4E72-B163-601A563A2A37}" type="slidenum">
+              <a:rPr lang="en-GB" smtClean="0"/>
+              <a:pPr>
+                <a:defRPr/>
+              </a:pPr>
+              <a:t>42</a:t>
+            </a:fld>
+            <a:endParaRPr lang="en-GB"/>
+          </a:p>
+        </p:txBody>
+      </p:sp>
+      <p:pic>
+        <p:nvPicPr>
+          <p:cNvPr id="10246" name="Picture 6" descr="http://cem.com/e107_images/custom/students_lab.png"/>
+          <p:cNvPicPr>
+            <a:picLocks noChangeAspect="1" noChangeArrowheads="1"/>
+          </p:cNvPicPr>
+          <p:nvPr/>
+        </p:nvPicPr>
+        <p:blipFill>
+          <a:blip r:embed="rId2">
+            <a:extLst>
+              <a:ext uri="{28A0092B-C50C-407E-A947-70E740481C1C}">
+                <a14:useLocalDpi xmlns:a14="http://schemas.microsoft.com/office/drawing/2010/main" val="0"/>
+              </a:ext>
+            </a:extLst>
+          </a:blip>
+          <a:srcRect/>
+          <a:stretch>
+            <a:fillRect/>
+          </a:stretch>
+        </p:blipFill>
+        <p:spPr bwMode="auto">
+          <a:xfrm>
+            <a:off x="1752600" y="3048000"/>
+            <a:ext cx="4762500" cy="1971676"/>
+          </a:xfrm>
+          <a:prstGeom prst="rect">
+            <a:avLst/>
+          </a:prstGeom>
+          <a:noFill/>
+          <a:extLst>
+            <a:ext uri="{909E8E84-426E-40DD-AFC4-6F175D3DCCD1}">
+              <a14:hiddenFill xmlns:a14="http://schemas.microsoft.com/office/drawing/2010/main">
+                <a:solidFill>
+                  <a:srgbClr val="FFFFFF"/>
+                </a:solidFill>
+              </a14:hiddenFill>
+            </a:ext>
+          </a:extLst>
+        </p:spPr>
+      </p:pic>
+      <p:sp>
+        <p:nvSpPr>
+          <p:cNvPr id="7" name="Rectangle 6"/>
+          <p:cNvSpPr/>
+          <p:nvPr/>
+        </p:nvSpPr>
+        <p:spPr>
+          <a:xfrm>
+            <a:off x="457200" y="5465802"/>
+            <a:ext cx="8354888" cy="553998"/>
+          </a:xfrm>
+          <a:prstGeom prst="rect">
+            <a:avLst/>
+          </a:prstGeom>
+        </p:spPr>
+        <p:txBody>
+          <a:bodyPr wrap="square">
+            <a:spAutoFit/>
+          </a:bodyPr>
+          <a:lstStyle/>
+          <a:p>
+            <a:pPr>
+              <a:buClr>
+                <a:schemeClr val="tx1"/>
+              </a:buClr>
+              <a:buSzPct val="100000"/>
+              <a:defRPr/>
+            </a:pPr>
+            <a:r>
+              <a:rPr lang="en-GB" sz="3000" dirty="0"/>
+              <a:t>How good is the recipe/ability to follow the recipe?</a:t>
+            </a:r>
+          </a:p>
+        </p:txBody>
+      </p:sp>
+      <p:sp>
+        <p:nvSpPr>
+          <p:cNvPr id="8" name="Title 1"/>
+          <p:cNvSpPr txBox="1">
+            <a:spLocks/>
+          </p:cNvSpPr>
+          <p:nvPr/>
+        </p:nvSpPr>
+        <p:spPr>
+          <a:xfrm>
+            <a:off x="457200" y="274340"/>
+            <a:ext cx="8370887" cy="1143000"/>
+          </a:xfrm>
+          <a:prstGeom prst="rect">
+            <a:avLst/>
+          </a:prstGeom>
+        </p:spPr>
+        <p:txBody>
+          <a:bodyPr>
+            <a:noAutofit/>
+          </a:bodyPr>
+          <a:lstStyle>
+            <a:lvl1pPr algn="ctr" defTabSz="914400" rtl="0" eaLnBrk="1" latinLnBrk="0" hangingPunct="1">
+              <a:spcBef>
+                <a:spcPct val="0"/>
+              </a:spcBef>
+              <a:buNone/>
+              <a:defRPr sz="4400" kern="1200">
+                <a:solidFill>
+                  <a:schemeClr val="tx1"/>
+                </a:solidFill>
+                <a:latin typeface="+mj-lt"/>
+                <a:ea typeface="+mj-ea"/>
+                <a:cs typeface="+mj-cs"/>
+              </a:defRPr>
+            </a:lvl1pPr>
+          </a:lstStyle>
+          <a:p>
+            <a:r>
+              <a:rPr lang="en-GB" sz="2700" dirty="0" smtClean="0"/>
+              <a:t>The normal distribution</a:t>
+            </a:r>
+            <a:r>
+              <a:rPr lang="en-GB" dirty="0" smtClean="0"/>
+              <a:t/>
+            </a:r>
+            <a:br>
+              <a:rPr lang="en-GB" dirty="0" smtClean="0"/>
+            </a:br>
+            <a:r>
+              <a:rPr lang="en-GB" dirty="0" smtClean="0"/>
+              <a:t>Confidence intervals: </a:t>
+            </a:r>
+            <a:r>
+              <a:rPr lang="en-GB" u="sng" dirty="0" smtClean="0"/>
+              <a:t>small samples</a:t>
+            </a:r>
+            <a:endParaRPr lang="en-GB" u="sng" dirty="0"/>
+          </a:p>
+        </p:txBody>
+      </p:sp>
+    </p:spTree>
+    <p:extLst>
+      <p:ext uri="{BB962C8B-B14F-4D97-AF65-F5344CB8AC3E}">
+        <p14:creationId xmlns:p14="http://schemas.microsoft.com/office/powerpoint/2010/main" val="1537171718"/>
+      </p:ext>
+    </p:extLst>
+  </p:cSld>
+  <p:clrMapOvr>
+    <a:masterClrMapping/>
+  </p:clrMapOvr>
+  <mc:AlternateContent xmlns:mc="http://schemas.openxmlformats.org/markup-compatibility/2006" xmlns:p14="http://schemas.microsoft.com/office/powerpoint/2010/main">
+    <mc:Choice Requires="p14">
+      <p:transition spd="slow" p14:dur="2000"/>
+    </mc:Choice>
+    <mc:Fallback xmlns="">
+      <p:transition spd="slow"/>
+    </mc:Fallback>
+  </mc:AlternateContent>
+  <p:timing>
+    <p:tnLst>
+      <p:par>
+        <p:cTn id="1" dur="indefinite" restart="never" nodeType="tmRoot"/>
+      </p:par>
+    </p:tnLst>
+  </p:timing>
+</p:sld>
+</file>
+
+<file path=ppt/slides/slide43.xml><?xml version="1.0" encoding="utf-8"?>
+<p:sld xmlns:a="http://schemas.openxmlformats.org/drawingml/2006/main" xmlns:r="http://schemas.openxmlformats.org/officeDocument/2006/relationships" xmlns:p="http://schemas.openxmlformats.org/presentationml/2006/main">
+  <p:cSld>
+    <p:spTree>
+      <p:nvGrpSpPr>
+        <p:cNvPr id="1" name=""/>
+        <p:cNvGrpSpPr/>
+        <p:nvPr/>
+      </p:nvGrpSpPr>
+      <p:grpSpPr>
+        <a:xfrm>
+          <a:off x="0" y="0"/>
+          <a:ext cx="0" cy="0"/>
+          <a:chOff x="0" y="0"/>
+          <a:chExt cx="0" cy="0"/>
+        </a:xfrm>
+      </p:grpSpPr>
+      <p:sp>
+        <p:nvSpPr>
+          <p:cNvPr id="3" name="Content Placeholder 2"/>
+          <p:cNvSpPr>
+            <a:spLocks noGrp="1"/>
+          </p:cNvSpPr>
+          <p:nvPr>
+            <p:ph idx="1"/>
+          </p:nvPr>
+        </p:nvSpPr>
+        <p:spPr>
+          <a:xfrm>
+            <a:off x="395288" y="1773238"/>
+            <a:ext cx="8208962" cy="863600"/>
+          </a:xfrm>
+        </p:spPr>
+        <p:txBody>
+          <a:bodyPr>
+            <a:normAutofit fontScale="92500" lnSpcReduction="20000"/>
+          </a:bodyPr>
+          <a:lstStyle/>
+          <a:p>
+            <a:pPr marL="0" indent="0">
+              <a:buFont typeface="Wingdings" pitchFamily="2" charset="2"/>
+              <a:buNone/>
+              <a:defRPr/>
+            </a:pPr>
+            <a:r>
+              <a:rPr lang="en-GB" dirty="0" smtClean="0"/>
+              <a:t>19 lactate dehydrogenase solutions to a recipe that  </a:t>
+            </a:r>
+            <a:r>
+              <a:rPr lang="en-GB" u="sng" dirty="0" smtClean="0"/>
+              <a:t>should</a:t>
+            </a:r>
+            <a:r>
+              <a:rPr lang="en-GB" dirty="0" smtClean="0"/>
+              <a:t> yield a concentration of 1.5 </a:t>
+            </a:r>
+            <a:r>
+              <a:rPr lang="en-GB" dirty="0" err="1" smtClean="0"/>
+              <a:t>μmols</a:t>
+            </a:r>
+            <a:r>
+              <a:rPr lang="en-GB" dirty="0" smtClean="0"/>
+              <a:t> l</a:t>
+            </a:r>
+            <a:r>
+              <a:rPr lang="en-GB" baseline="30000" dirty="0" smtClean="0"/>
+              <a:t>-1</a:t>
+            </a:r>
+            <a:endParaRPr lang="en-GB" dirty="0" smtClean="0"/>
+          </a:p>
+          <a:p>
+            <a:pPr>
+              <a:defRPr/>
+            </a:pPr>
+            <a:endParaRPr lang="en-GB" dirty="0"/>
+          </a:p>
+        </p:txBody>
+      </p:sp>
+      <p:sp>
+        <p:nvSpPr>
           <p:cNvPr id="5" name="TextBox 4"/>
           <p:cNvSpPr txBox="1"/>
           <p:nvPr/>
@@ -27268,7 +27386,7 @@
               <a:pPr>
                 <a:defRPr/>
               </a:pPr>
-              <a:t>42</a:t>
+              <a:t>43</a:t>
             </a:fld>
             <a:endParaRPr lang="en-GB"/>
           </a:p>
@@ -27415,7 +27533,7 @@
 </p:sld>
 </file>
 
-<file path=ppt/slides/slide43.xml><?xml version="1.0" encoding="utf-8"?>
+<file path=ppt/slides/slide44.xml><?xml version="1.0" encoding="utf-8"?>
 <p:sld xmlns:a="http://schemas.openxmlformats.org/drawingml/2006/main" xmlns:r="http://schemas.openxmlformats.org/officeDocument/2006/relationships" xmlns:p="http://schemas.openxmlformats.org/presentationml/2006/main">
   <p:cSld>
     <p:spTree>
@@ -28541,7 +28659,7 @@
               <a:pPr>
                 <a:defRPr/>
               </a:pPr>
-              <a:t>43</a:t>
+              <a:t>44</a:t>
             </a:fld>
             <a:endParaRPr lang="en-GB"/>
           </a:p>
@@ -28891,7 +29009,7 @@
 </p:sld>
 </file>
 
-<file path=ppt/slides/slide44.xml><?xml version="1.0" encoding="utf-8"?>
+<file path=ppt/slides/slide45.xml><?xml version="1.0" encoding="utf-8"?>
 <p:sld xmlns:a="http://schemas.openxmlformats.org/drawingml/2006/main" xmlns:r="http://schemas.openxmlformats.org/officeDocument/2006/relationships" xmlns:p="http://schemas.openxmlformats.org/presentationml/2006/main">
   <p:cSld>
     <p:spTree>
@@ -29478,7 +29596,7 @@
               <a:pPr>
                 <a:defRPr/>
               </a:pPr>
-              <a:t>44</a:t>
+              <a:t>45</a:t>
             </a:fld>
             <a:endParaRPr lang="en-GB"/>
           </a:p>
@@ -29659,7 +29777,7 @@
 </p:sld>
 </file>
 
-<file path=ppt/slides/slide45.xml><?xml version="1.0" encoding="utf-8"?>
+<file path=ppt/slides/slide46.xml><?xml version="1.0" encoding="utf-8"?>
 <p:sld xmlns:a="http://schemas.openxmlformats.org/drawingml/2006/main" xmlns:r="http://schemas.openxmlformats.org/officeDocument/2006/relationships" xmlns:p="http://schemas.openxmlformats.org/presentationml/2006/main">
   <p:cSld>
     <p:spTree>
@@ -30040,7 +30158,7 @@
             <a:fld id="{B6F15528-21DE-4FAA-801E-634DDDAF4B2B}" type="slidenum">
               <a:rPr lang="en-US" smtClean="0"/>
               <a:pPr/>
-              <a:t>45</a:t>
+              <a:t>46</a:t>
             </a:fld>
             <a:endParaRPr lang="en-US"/>
           </a:p>

</xml_diff>